<commit_message>
FY22Q2 refresh - msteams-messaging-extensions
- run through all exercise steps in associated MSLearn module to validate good working order
- updated steps & fixed typos where necessary
- updated slides where necessary
- update code samples to reflect MSLearn HOL exercise refresh & updates
- any & all users/names/company names/pictures/IDs are not real people/tenants... all are from M365 demo tenants provided by Microsoft
</commit_message>
<xml_diff>
--- a/Teams/20 Messaging Extensions/slides.pptx
+++ b/Teams/20 Messaging Extensions/slides.pptx
@@ -30,9 +30,9 @@
     <p:sldId id="1739" r:id="rId21"/>
     <p:sldId id="1740" r:id="rId22"/>
     <p:sldId id="1748" r:id="rId23"/>
-    <p:sldId id="1749" r:id="rId24"/>
-    <p:sldId id="1750" r:id="rId25"/>
-    <p:sldId id="1751" r:id="rId26"/>
+    <p:sldId id="1714" r:id="rId24"/>
+    <p:sldId id="1715" r:id="rId25"/>
+    <p:sldId id="1716" r:id="rId26"/>
     <p:sldId id="1752" r:id="rId27"/>
     <p:sldId id="1753" r:id="rId28"/>
   </p:sldIdLst>
@@ -169,9 +169,9 @@
         <p14:section name="03" id="{68F8ADB8-76D7-3344-B3A9-9BE71AC80246}">
           <p14:sldIdLst>
             <p14:sldId id="1748"/>
-            <p14:sldId id="1749"/>
-            <p14:sldId id="1750"/>
-            <p14:sldId id="1751"/>
+            <p14:sldId id="1714"/>
+            <p14:sldId id="1715"/>
+            <p14:sldId id="1716"/>
             <p14:sldId id="1752"/>
           </p14:sldIdLst>
         </p14:section>
@@ -286,7 +286,7 @@
           <a:p>
             <a:fld id="{F5D67128-0ED3-F84C-AB75-26956BD6F773}" type="datetimeFigureOut">
               <a:rPr lang="en-US" smtClean="0"/>
-              <a:t>5/26/21</a:t>
+              <a:t>12/11/21</a:t>
             </a:fld>
             <a:endParaRPr lang="en-US"/>
           </a:p>
@@ -463,7 +463,7 @@
           <a:p>
             <a:fld id="{9E65F564-29A8-0243-B41B-CCCF740F82F1}" type="datetimeFigureOut">
               <a:rPr lang="en-US" smtClean="0"/>
-              <a:t>5/26/21</a:t>
+              <a:t>12/11/21</a:t>
             </a:fld>
             <a:endParaRPr lang="en-US"/>
           </a:p>
@@ -730,6 +730,654 @@
 </p:notesMaster>
 </file>
 
+<file path=ppt/notesSlides/notesSlide1.xml><?xml version="1.0" encoding="utf-8"?>
+<p:notes xmlns:a="http://schemas.openxmlformats.org/drawingml/2006/main" xmlns:r="http://schemas.openxmlformats.org/officeDocument/2006/relationships" xmlns:p="http://schemas.openxmlformats.org/presentationml/2006/main">
+  <p:cSld>
+    <p:spTree>
+      <p:nvGrpSpPr>
+        <p:cNvPr id="1" name=""/>
+        <p:cNvGrpSpPr/>
+        <p:nvPr/>
+      </p:nvGrpSpPr>
+      <p:grpSpPr>
+        <a:xfrm>
+          <a:off x="0" y="0"/>
+          <a:ext cx="0" cy="0"/>
+          <a:chOff x="0" y="0"/>
+          <a:chExt cx="0" cy="0"/>
+        </a:xfrm>
+      </p:grpSpPr>
+      <p:sp>
+        <p:nvSpPr>
+          <p:cNvPr id="2" name="Slide Image Placeholder 1"/>
+          <p:cNvSpPr>
+            <a:spLocks noGrp="1" noRot="1" noChangeAspect="1"/>
+          </p:cNvSpPr>
+          <p:nvPr>
+            <p:ph type="sldImg"/>
+          </p:nvPr>
+        </p:nvSpPr>
+        <p:spPr/>
+      </p:sp>
+      <p:sp>
+        <p:nvSpPr>
+          <p:cNvPr id="3" name="Notes Placeholder 2"/>
+          <p:cNvSpPr>
+            <a:spLocks noGrp="1"/>
+          </p:cNvSpPr>
+          <p:nvPr>
+            <p:ph type="body" idx="1"/>
+          </p:nvPr>
+        </p:nvSpPr>
+        <p:spPr/>
+        <p:txBody>
+          <a:bodyPr/>
+          <a:lstStyle/>
+          <a:p>
+            <a:r>
+              <a:rPr lang="en-US" dirty="0"/>
+              <a:t>With link unfurling your app can register to receive an `invoke` activity when URLs with a particular domain are pasted into the compose message area. The `invoke` will contain the full URL that was pasted into the compose message area, and you can respond with a card the user can unfurl, providing additional information or actions. This works similarly to a search command, with the URL serving as the search term.</a:t>
+            </a:r>
+          </a:p>
+        </p:txBody>
+      </p:sp>
+      <p:sp>
+        <p:nvSpPr>
+          <p:cNvPr id="4" name="Header Placeholder 3"/>
+          <p:cNvSpPr>
+            <a:spLocks noGrp="1"/>
+          </p:cNvSpPr>
+          <p:nvPr>
+            <p:ph type="hdr" sz="quarter"/>
+          </p:nvPr>
+        </p:nvSpPr>
+        <p:spPr/>
+        <p:txBody>
+          <a:bodyPr/>
+          <a:lstStyle/>
+          <a:p>
+            <a:endParaRPr lang="en-US" dirty="0"/>
+          </a:p>
+        </p:txBody>
+      </p:sp>
+      <p:sp>
+        <p:nvSpPr>
+          <p:cNvPr id="5" name="Footer Placeholder 4"/>
+          <p:cNvSpPr>
+            <a:spLocks noGrp="1"/>
+          </p:cNvSpPr>
+          <p:nvPr>
+            <p:ph type="ftr" sz="quarter" idx="4"/>
+          </p:nvPr>
+        </p:nvSpPr>
+        <p:spPr/>
+        <p:txBody>
+          <a:bodyPr/>
+          <a:lstStyle/>
+          <a:p>
+            <a:pPr defTabSz="914099" eaLnBrk="0" hangingPunct="0"/>
+            <a:r>
+              <a:rPr lang="en-US" sz="400">
+                <a:gradFill>
+                  <a:gsLst>
+                    <a:gs pos="0">
+                      <a:prstClr val="black"/>
+                    </a:gs>
+                    <a:gs pos="100000">
+                      <a:prstClr val="black"/>
+                    </a:gs>
+                  </a:gsLst>
+                  <a:lin ang="5400000" scaled="0"/>
+                </a:gradFill>
+                <a:latin typeface="Segoe UI" pitchFamily="34" charset="0"/>
+                <a:ea typeface="Segoe UI" pitchFamily="34" charset="0"/>
+                <a:cs typeface="Segoe UI" pitchFamily="34" charset="0"/>
+              </a:rPr>
+              <a:t>© Microsoft Corporation. All rights reserved. MICROSOFT MAKES NO WARRANTIES, EXPRESS, IMPLIED OR STATUTORY, AS TO THE INFORMATION IN THIS PRESENTATION.</a:t>
+            </a:r>
+            <a:endParaRPr lang="en-US" sz="400" dirty="0">
+              <a:gradFill>
+                <a:gsLst>
+                  <a:gs pos="0">
+                    <a:prstClr val="black"/>
+                  </a:gs>
+                  <a:gs pos="100000">
+                    <a:prstClr val="black"/>
+                  </a:gs>
+                </a:gsLst>
+                <a:lin ang="5400000" scaled="0"/>
+              </a:gradFill>
+              <a:latin typeface="Segoe UI" pitchFamily="34" charset="0"/>
+              <a:ea typeface="Segoe UI" pitchFamily="34" charset="0"/>
+              <a:cs typeface="Segoe UI" pitchFamily="34" charset="0"/>
+            </a:endParaRPr>
+          </a:p>
+        </p:txBody>
+      </p:sp>
+      <p:sp>
+        <p:nvSpPr>
+          <p:cNvPr id="6" name="Date Placeholder 5"/>
+          <p:cNvSpPr>
+            <a:spLocks noGrp="1"/>
+          </p:cNvSpPr>
+          <p:nvPr>
+            <p:ph type="dt" idx="1"/>
+          </p:nvPr>
+        </p:nvSpPr>
+        <p:spPr/>
+        <p:txBody>
+          <a:bodyPr/>
+          <a:lstStyle/>
+          <a:p>
+            <a:fld id="{D18B56EA-E28F-4F92-9F16-7A6F2501B303}" type="datetime8">
+              <a:rPr lang="en-US" smtClean="0"/>
+              <a:t>12/11/21 9:53 AM</a:t>
+            </a:fld>
+            <a:endParaRPr lang="en-US" dirty="0"/>
+          </a:p>
+        </p:txBody>
+      </p:sp>
+      <p:sp>
+        <p:nvSpPr>
+          <p:cNvPr id="7" name="Slide Number Placeholder 6"/>
+          <p:cNvSpPr>
+            <a:spLocks noGrp="1"/>
+          </p:cNvSpPr>
+          <p:nvPr>
+            <p:ph type="sldNum" sz="quarter" idx="5"/>
+          </p:nvPr>
+        </p:nvSpPr>
+        <p:spPr/>
+        <p:txBody>
+          <a:bodyPr/>
+          <a:lstStyle/>
+          <a:p>
+            <a:fld id="{B4008EB6-D09E-4580-8CD6-DDB14511944F}" type="slidenum">
+              <a:rPr lang="en-US" smtClean="0"/>
+              <a:pPr/>
+              <a:t>20</a:t>
+            </a:fld>
+            <a:endParaRPr lang="en-US" dirty="0"/>
+          </a:p>
+        </p:txBody>
+      </p:sp>
+    </p:spTree>
+    <p:extLst>
+      <p:ext uri="{BB962C8B-B14F-4D97-AF65-F5344CB8AC3E}">
+        <p14:creationId xmlns:p14="http://schemas.microsoft.com/office/powerpoint/2010/main" val="3876678268"/>
+      </p:ext>
+    </p:extLst>
+  </p:cSld>
+  <p:clrMapOvr>
+    <a:masterClrMapping/>
+  </p:clrMapOvr>
+</p:notes>
+</file>
+
+<file path=ppt/notesSlides/notesSlide2.xml><?xml version="1.0" encoding="utf-8"?>
+<p:notes xmlns:a="http://schemas.openxmlformats.org/drawingml/2006/main" xmlns:r="http://schemas.openxmlformats.org/officeDocument/2006/relationships" xmlns:p="http://schemas.openxmlformats.org/presentationml/2006/main">
+  <p:cSld>
+    <p:spTree>
+      <p:nvGrpSpPr>
+        <p:cNvPr id="1" name=""/>
+        <p:cNvGrpSpPr/>
+        <p:nvPr/>
+      </p:nvGrpSpPr>
+      <p:grpSpPr>
+        <a:xfrm>
+          <a:off x="0" y="0"/>
+          <a:ext cx="0" cy="0"/>
+          <a:chOff x="0" y="0"/>
+          <a:chExt cx="0" cy="0"/>
+        </a:xfrm>
+      </p:grpSpPr>
+      <p:sp>
+        <p:nvSpPr>
+          <p:cNvPr id="2" name="Slide Image Placeholder 1"/>
+          <p:cNvSpPr>
+            <a:spLocks noGrp="1" noRot="1" noChangeAspect="1"/>
+          </p:cNvSpPr>
+          <p:nvPr>
+            <p:ph type="sldImg"/>
+          </p:nvPr>
+        </p:nvSpPr>
+        <p:spPr/>
+      </p:sp>
+      <p:sp>
+        <p:nvSpPr>
+          <p:cNvPr id="3" name="Notes Placeholder 2"/>
+          <p:cNvSpPr>
+            <a:spLocks noGrp="1"/>
+          </p:cNvSpPr>
+          <p:nvPr>
+            <p:ph type="body" idx="1"/>
+          </p:nvPr>
+        </p:nvSpPr>
+        <p:spPr/>
+        <p:txBody>
+          <a:bodyPr/>
+          <a:lstStyle/>
+          <a:p>
+            <a:r>
+              <a:rPr lang="en-US" dirty="0"/>
+              <a:t>Adding a link unfurling messaging extension follows a similar process as action commands and search commands. You'll first register domain(s) supported by your messaging extension and then implement the handler in your web service.</a:t>
+            </a:r>
+          </a:p>
+          <a:p>
+            <a:endParaRPr lang="en-US" dirty="0"/>
+          </a:p>
+          <a:p>
+            <a:r>
+              <a:rPr lang="en-US" dirty="0"/>
+              <a:t>The first step is to register your link unfurling messaging extension in your Microsoft Teams app manifest file. Do this by adding an entry to the `</a:t>
+            </a:r>
+            <a:r>
+              <a:rPr lang="en-US" dirty="0" err="1"/>
+              <a:t>messageHandlers</a:t>
+            </a:r>
+            <a:r>
+              <a:rPr lang="en-US" dirty="0"/>
+              <a:t>` property on the `</a:t>
+            </a:r>
+            <a:r>
+              <a:rPr lang="en-US" dirty="0" err="1"/>
+              <a:t>composeExtensions</a:t>
+            </a:r>
+            <a:r>
+              <a:rPr lang="en-US" dirty="0"/>
+              <a:t>` property.</a:t>
+            </a:r>
+          </a:p>
+          <a:p>
+            <a:endParaRPr lang="en-US" dirty="0"/>
+          </a:p>
+          <a:p>
+            <a:r>
+              <a:rPr lang="en-US" dirty="0"/>
+              <a:t>The `type` property must be set to `link`.</a:t>
+            </a:r>
+          </a:p>
+          <a:p>
+            <a:endParaRPr lang="en-US" dirty="0"/>
+          </a:p>
+          <a:p>
+            <a:r>
+              <a:rPr lang="en-US" dirty="0"/>
+              <a:t>The `value` property must contain a `domains` collection of domains that the link message handler watches for. If a link is added to a message that matches a domain listed in this collection, the message handler is invoked.</a:t>
+            </a:r>
+          </a:p>
+          <a:p>
+            <a:endParaRPr lang="en-US" dirty="0"/>
+          </a:p>
+          <a:p>
+            <a:r>
+              <a:rPr lang="en-US" dirty="0"/>
+              <a:t>In addition to the `</a:t>
+            </a:r>
+            <a:r>
+              <a:rPr lang="en-US" dirty="0" err="1"/>
+              <a:t>messageHandlers</a:t>
+            </a:r>
+            <a:r>
+              <a:rPr lang="en-US" dirty="0"/>
+              <a:t>` property, all domains must also be listed in the `</a:t>
+            </a:r>
+            <a:r>
+              <a:rPr lang="en-US" dirty="0" err="1"/>
+              <a:t>validDomains</a:t>
+            </a:r>
+            <a:r>
+              <a:rPr lang="en-US" dirty="0"/>
+              <a:t>` property of the Microsoft Teams app's manifest.</a:t>
+            </a:r>
+          </a:p>
+          <a:p>
+            <a:endParaRPr lang="en-US" dirty="0"/>
+          </a:p>
+        </p:txBody>
+      </p:sp>
+      <p:sp>
+        <p:nvSpPr>
+          <p:cNvPr id="4" name="Header Placeholder 3"/>
+          <p:cNvSpPr>
+            <a:spLocks noGrp="1"/>
+          </p:cNvSpPr>
+          <p:nvPr>
+            <p:ph type="hdr" sz="quarter"/>
+          </p:nvPr>
+        </p:nvSpPr>
+        <p:spPr/>
+        <p:txBody>
+          <a:bodyPr/>
+          <a:lstStyle/>
+          <a:p>
+            <a:endParaRPr lang="en-US" dirty="0"/>
+          </a:p>
+        </p:txBody>
+      </p:sp>
+      <p:sp>
+        <p:nvSpPr>
+          <p:cNvPr id="5" name="Footer Placeholder 4"/>
+          <p:cNvSpPr>
+            <a:spLocks noGrp="1"/>
+          </p:cNvSpPr>
+          <p:nvPr>
+            <p:ph type="ftr" sz="quarter" idx="4"/>
+          </p:nvPr>
+        </p:nvSpPr>
+        <p:spPr/>
+        <p:txBody>
+          <a:bodyPr/>
+          <a:lstStyle/>
+          <a:p>
+            <a:pPr defTabSz="914099" eaLnBrk="0" hangingPunct="0"/>
+            <a:r>
+              <a:rPr lang="en-US" sz="400">
+                <a:gradFill>
+                  <a:gsLst>
+                    <a:gs pos="0">
+                      <a:prstClr val="black"/>
+                    </a:gs>
+                    <a:gs pos="100000">
+                      <a:prstClr val="black"/>
+                    </a:gs>
+                  </a:gsLst>
+                  <a:lin ang="5400000" scaled="0"/>
+                </a:gradFill>
+                <a:latin typeface="Segoe UI" pitchFamily="34" charset="0"/>
+                <a:ea typeface="Segoe UI" pitchFamily="34" charset="0"/>
+                <a:cs typeface="Segoe UI" pitchFamily="34" charset="0"/>
+              </a:rPr>
+              <a:t>© Microsoft Corporation. All rights reserved. MICROSOFT MAKES NO WARRANTIES, EXPRESS, IMPLIED OR STATUTORY, AS TO THE INFORMATION IN THIS PRESENTATION.</a:t>
+            </a:r>
+            <a:endParaRPr lang="en-US" sz="400" dirty="0">
+              <a:gradFill>
+                <a:gsLst>
+                  <a:gs pos="0">
+                    <a:prstClr val="black"/>
+                  </a:gs>
+                  <a:gs pos="100000">
+                    <a:prstClr val="black"/>
+                  </a:gs>
+                </a:gsLst>
+                <a:lin ang="5400000" scaled="0"/>
+              </a:gradFill>
+              <a:latin typeface="Segoe UI" pitchFamily="34" charset="0"/>
+              <a:ea typeface="Segoe UI" pitchFamily="34" charset="0"/>
+              <a:cs typeface="Segoe UI" pitchFamily="34" charset="0"/>
+            </a:endParaRPr>
+          </a:p>
+        </p:txBody>
+      </p:sp>
+      <p:sp>
+        <p:nvSpPr>
+          <p:cNvPr id="6" name="Date Placeholder 5"/>
+          <p:cNvSpPr>
+            <a:spLocks noGrp="1"/>
+          </p:cNvSpPr>
+          <p:nvPr>
+            <p:ph type="dt" idx="1"/>
+          </p:nvPr>
+        </p:nvSpPr>
+        <p:spPr/>
+        <p:txBody>
+          <a:bodyPr/>
+          <a:lstStyle/>
+          <a:p>
+            <a:fld id="{D18B56EA-E28F-4F92-9F16-7A6F2501B303}" type="datetime8">
+              <a:rPr lang="en-US" smtClean="0"/>
+              <a:t>12/11/21 9:53 AM</a:t>
+            </a:fld>
+            <a:endParaRPr lang="en-US" dirty="0"/>
+          </a:p>
+        </p:txBody>
+      </p:sp>
+      <p:sp>
+        <p:nvSpPr>
+          <p:cNvPr id="7" name="Slide Number Placeholder 6"/>
+          <p:cNvSpPr>
+            <a:spLocks noGrp="1"/>
+          </p:cNvSpPr>
+          <p:nvPr>
+            <p:ph type="sldNum" sz="quarter" idx="5"/>
+          </p:nvPr>
+        </p:nvSpPr>
+        <p:spPr/>
+        <p:txBody>
+          <a:bodyPr/>
+          <a:lstStyle/>
+          <a:p>
+            <a:fld id="{B4008EB6-D09E-4580-8CD6-DDB14511944F}" type="slidenum">
+              <a:rPr lang="en-US" smtClean="0"/>
+              <a:pPr/>
+              <a:t>21</a:t>
+            </a:fld>
+            <a:endParaRPr lang="en-US" dirty="0"/>
+          </a:p>
+        </p:txBody>
+      </p:sp>
+    </p:spTree>
+    <p:extLst>
+      <p:ext uri="{BB962C8B-B14F-4D97-AF65-F5344CB8AC3E}">
+        <p14:creationId xmlns:p14="http://schemas.microsoft.com/office/powerpoint/2010/main" val="2884999375"/>
+      </p:ext>
+    </p:extLst>
+  </p:cSld>
+  <p:clrMapOvr>
+    <a:masterClrMapping/>
+  </p:clrMapOvr>
+</p:notes>
+</file>
+
+<file path=ppt/notesSlides/notesSlide3.xml><?xml version="1.0" encoding="utf-8"?>
+<p:notes xmlns:a="http://schemas.openxmlformats.org/drawingml/2006/main" xmlns:r="http://schemas.openxmlformats.org/officeDocument/2006/relationships" xmlns:p="http://schemas.openxmlformats.org/presentationml/2006/main">
+  <p:cSld>
+    <p:spTree>
+      <p:nvGrpSpPr>
+        <p:cNvPr id="1" name=""/>
+        <p:cNvGrpSpPr/>
+        <p:nvPr/>
+      </p:nvGrpSpPr>
+      <p:grpSpPr>
+        <a:xfrm>
+          <a:off x="0" y="0"/>
+          <a:ext cx="0" cy="0"/>
+          <a:chOff x="0" y="0"/>
+          <a:chExt cx="0" cy="0"/>
+        </a:xfrm>
+      </p:grpSpPr>
+      <p:sp>
+        <p:nvSpPr>
+          <p:cNvPr id="2" name="Slide Image Placeholder 1"/>
+          <p:cNvSpPr>
+            <a:spLocks noGrp="1" noRot="1" noChangeAspect="1"/>
+          </p:cNvSpPr>
+          <p:nvPr>
+            <p:ph type="sldImg"/>
+          </p:nvPr>
+        </p:nvSpPr>
+        <p:spPr/>
+      </p:sp>
+      <p:sp>
+        <p:nvSpPr>
+          <p:cNvPr id="3" name="Notes Placeholder 2"/>
+          <p:cNvSpPr>
+            <a:spLocks noGrp="1"/>
+          </p:cNvSpPr>
+          <p:nvPr>
+            <p:ph type="body" idx="1"/>
+          </p:nvPr>
+        </p:nvSpPr>
+        <p:spPr/>
+        <p:txBody>
+          <a:bodyPr/>
+          <a:lstStyle/>
+          <a:p>
+            <a:r>
+              <a:rPr lang="en-US" dirty="0"/>
+              <a:t>When a valid domain is detected by the Microsoft Teams client, the Bot Framework will send an `Activity` object to your web service of type `</a:t>
+            </a:r>
+            <a:r>
+              <a:rPr lang="en-US" dirty="0" err="1"/>
+              <a:t>composeExtension</a:t>
+            </a:r>
+            <a:r>
+              <a:rPr lang="en-US" dirty="0"/>
+              <a:t>/</a:t>
+            </a:r>
+            <a:r>
+              <a:rPr lang="en-US" dirty="0" err="1"/>
+              <a:t>queryLink</a:t>
+            </a:r>
+            <a:r>
+              <a:rPr lang="en-US" dirty="0"/>
+              <a:t>` with the URL from the message.</a:t>
+            </a:r>
+          </a:p>
+          <a:p>
+            <a:endParaRPr lang="en-US" dirty="0"/>
+          </a:p>
+          <a:p>
+            <a:r>
+              <a:rPr lang="en-US" dirty="0"/>
+              <a:t>Your web service will respond with a similar response as the search command. However, if you return multiple attachments, only the first one in the collection will be used by the Microsoft Teams client</a:t>
+            </a:r>
+          </a:p>
+        </p:txBody>
+      </p:sp>
+      <p:sp>
+        <p:nvSpPr>
+          <p:cNvPr id="4" name="Header Placeholder 3"/>
+          <p:cNvSpPr>
+            <a:spLocks noGrp="1"/>
+          </p:cNvSpPr>
+          <p:nvPr>
+            <p:ph type="hdr" sz="quarter"/>
+          </p:nvPr>
+        </p:nvSpPr>
+        <p:spPr/>
+        <p:txBody>
+          <a:bodyPr/>
+          <a:lstStyle/>
+          <a:p>
+            <a:endParaRPr lang="en-US" dirty="0"/>
+          </a:p>
+        </p:txBody>
+      </p:sp>
+      <p:sp>
+        <p:nvSpPr>
+          <p:cNvPr id="5" name="Footer Placeholder 4"/>
+          <p:cNvSpPr>
+            <a:spLocks noGrp="1"/>
+          </p:cNvSpPr>
+          <p:nvPr>
+            <p:ph type="ftr" sz="quarter" idx="4"/>
+          </p:nvPr>
+        </p:nvSpPr>
+        <p:spPr/>
+        <p:txBody>
+          <a:bodyPr/>
+          <a:lstStyle/>
+          <a:p>
+            <a:pPr defTabSz="914099" eaLnBrk="0" hangingPunct="0"/>
+            <a:r>
+              <a:rPr lang="en-US" sz="400">
+                <a:gradFill>
+                  <a:gsLst>
+                    <a:gs pos="0">
+                      <a:prstClr val="black"/>
+                    </a:gs>
+                    <a:gs pos="100000">
+                      <a:prstClr val="black"/>
+                    </a:gs>
+                  </a:gsLst>
+                  <a:lin ang="5400000" scaled="0"/>
+                </a:gradFill>
+                <a:latin typeface="Segoe UI" pitchFamily="34" charset="0"/>
+                <a:ea typeface="Segoe UI" pitchFamily="34" charset="0"/>
+                <a:cs typeface="Segoe UI" pitchFamily="34" charset="0"/>
+              </a:rPr>
+              <a:t>© Microsoft Corporation. All rights reserved. MICROSOFT MAKES NO WARRANTIES, EXPRESS, IMPLIED OR STATUTORY, AS TO THE INFORMATION IN THIS PRESENTATION.</a:t>
+            </a:r>
+            <a:endParaRPr lang="en-US" sz="400" dirty="0">
+              <a:gradFill>
+                <a:gsLst>
+                  <a:gs pos="0">
+                    <a:prstClr val="black"/>
+                  </a:gs>
+                  <a:gs pos="100000">
+                    <a:prstClr val="black"/>
+                  </a:gs>
+                </a:gsLst>
+                <a:lin ang="5400000" scaled="0"/>
+              </a:gradFill>
+              <a:latin typeface="Segoe UI" pitchFamily="34" charset="0"/>
+              <a:ea typeface="Segoe UI" pitchFamily="34" charset="0"/>
+              <a:cs typeface="Segoe UI" pitchFamily="34" charset="0"/>
+            </a:endParaRPr>
+          </a:p>
+        </p:txBody>
+      </p:sp>
+      <p:sp>
+        <p:nvSpPr>
+          <p:cNvPr id="6" name="Date Placeholder 5"/>
+          <p:cNvSpPr>
+            <a:spLocks noGrp="1"/>
+          </p:cNvSpPr>
+          <p:nvPr>
+            <p:ph type="dt" idx="1"/>
+          </p:nvPr>
+        </p:nvSpPr>
+        <p:spPr/>
+        <p:txBody>
+          <a:bodyPr/>
+          <a:lstStyle/>
+          <a:p>
+            <a:fld id="{D18B56EA-E28F-4F92-9F16-7A6F2501B303}" type="datetime8">
+              <a:rPr lang="en-US" smtClean="0"/>
+              <a:t>12/11/21 9:53 AM</a:t>
+            </a:fld>
+            <a:endParaRPr lang="en-US" dirty="0"/>
+          </a:p>
+        </p:txBody>
+      </p:sp>
+      <p:sp>
+        <p:nvSpPr>
+          <p:cNvPr id="7" name="Slide Number Placeholder 6"/>
+          <p:cNvSpPr>
+            <a:spLocks noGrp="1"/>
+          </p:cNvSpPr>
+          <p:nvPr>
+            <p:ph type="sldNum" sz="quarter" idx="5"/>
+          </p:nvPr>
+        </p:nvSpPr>
+        <p:spPr/>
+        <p:txBody>
+          <a:bodyPr/>
+          <a:lstStyle/>
+          <a:p>
+            <a:fld id="{B4008EB6-D09E-4580-8CD6-DDB14511944F}" type="slidenum">
+              <a:rPr lang="en-US" smtClean="0"/>
+              <a:pPr/>
+              <a:t>22</a:t>
+            </a:fld>
+            <a:endParaRPr lang="en-US" dirty="0"/>
+          </a:p>
+        </p:txBody>
+      </p:sp>
+    </p:spTree>
+    <p:extLst>
+      <p:ext uri="{BB962C8B-B14F-4D97-AF65-F5344CB8AC3E}">
+        <p14:creationId xmlns:p14="http://schemas.microsoft.com/office/powerpoint/2010/main" val="587983355"/>
+      </p:ext>
+    </p:extLst>
+  </p:cSld>
+  <p:clrMapOvr>
+    <a:masterClrMapping/>
+  </p:clrMapOvr>
+</p:notes>
+</file>
+
 <file path=ppt/slideLayouts/slideLayout1.xml><?xml version="1.0" encoding="utf-8"?>
 <p:sldLayout xmlns:a="http://schemas.openxmlformats.org/drawingml/2006/main" xmlns:r="http://schemas.openxmlformats.org/officeDocument/2006/relationships" xmlns:p="http://schemas.openxmlformats.org/presentationml/2006/main" type="title" preserve="1">
   <p:cSld name="Title Slide &lt;blank&gt;">
@@ -4064,6 +4712,307 @@
 </p:sldLayout>
 </file>
 
+<file path=ppt/slideLayouts/slideLayout20.xml><?xml version="1.0" encoding="utf-8"?>
+<p:sldLayout xmlns:a="http://schemas.openxmlformats.org/drawingml/2006/main" xmlns:r="http://schemas.openxmlformats.org/officeDocument/2006/relationships" xmlns:p="http://schemas.openxmlformats.org/presentationml/2006/main" userDrawn="1">
+  <p:cSld name="Text Layout">
+    <p:spTree>
+      <p:nvGrpSpPr>
+        <p:cNvPr id="1" name=""/>
+        <p:cNvGrpSpPr/>
+        <p:nvPr/>
+      </p:nvGrpSpPr>
+      <p:grpSpPr>
+        <a:xfrm>
+          <a:off x="0" y="0"/>
+          <a:ext cx="0" cy="0"/>
+          <a:chOff x="0" y="0"/>
+          <a:chExt cx="0" cy="0"/>
+        </a:xfrm>
+      </p:grpSpPr>
+      <p:sp>
+        <p:nvSpPr>
+          <p:cNvPr id="2" name="Title 1"/>
+          <p:cNvSpPr>
+            <a:spLocks noGrp="1"/>
+          </p:cNvSpPr>
+          <p:nvPr>
+            <p:ph type="title" hasCustomPrompt="1"/>
+          </p:nvPr>
+        </p:nvSpPr>
+        <p:spPr>
+          <a:xfrm>
+            <a:off x="455995" y="620428"/>
+            <a:ext cx="11306469" cy="403137"/>
+          </a:xfrm>
+        </p:spPr>
+        <p:txBody>
+          <a:bodyPr wrap="square" lIns="0" tIns="0" rIns="0" bIns="0">
+            <a:spAutoFit/>
+          </a:bodyPr>
+          <a:lstStyle>
+            <a:lvl1pPr>
+              <a:lnSpc>
+                <a:spcPts val="3137"/>
+              </a:lnSpc>
+              <a:defRPr sz="2745">
+                <a:solidFill>
+                  <a:schemeClr val="tx1"/>
+                </a:solidFill>
+              </a:defRPr>
+            </a:lvl1pPr>
+          </a:lstStyle>
+          <a:p>
+            <a:r>
+              <a:rPr lang="en-US" dirty="0"/>
+              <a:t>Heading Segoe UI </a:t>
+            </a:r>
+            <a:r>
+              <a:rPr lang="en-US" dirty="0" err="1"/>
+              <a:t>Semibold</a:t>
+            </a:r>
+            <a:r>
+              <a:rPr lang="en-US" dirty="0"/>
+              <a:t> 28/32</a:t>
+            </a:r>
+          </a:p>
+        </p:txBody>
+      </p:sp>
+      <p:sp>
+        <p:nvSpPr>
+          <p:cNvPr id="4" name="Text Placeholder 3"/>
+          <p:cNvSpPr>
+            <a:spLocks noGrp="1"/>
+          </p:cNvSpPr>
+          <p:nvPr>
+            <p:ph type="body" sz="quarter" idx="10" hasCustomPrompt="1"/>
+          </p:nvPr>
+        </p:nvSpPr>
+        <p:spPr>
+          <a:xfrm>
+            <a:off x="455995" y="1882332"/>
+            <a:ext cx="11306469" cy="287771"/>
+          </a:xfrm>
+        </p:spPr>
+        <p:txBody>
+          <a:bodyPr wrap="square" lIns="0" tIns="0" rIns="0" bIns="0">
+            <a:spAutoFit/>
+          </a:bodyPr>
+          <a:lstStyle>
+            <a:lvl1pPr marL="0" indent="0">
+              <a:lnSpc>
+                <a:spcPts val="2353"/>
+              </a:lnSpc>
+              <a:buNone/>
+              <a:defRPr sz="1961" b="0" i="0">
+                <a:solidFill>
+                  <a:schemeClr val="tx1"/>
+                </a:solidFill>
+                <a:latin typeface="+mn-lt"/>
+              </a:defRPr>
+            </a:lvl1pPr>
+            <a:lvl2pPr marL="224097" indent="0">
+              <a:buNone/>
+              <a:defRPr/>
+            </a:lvl2pPr>
+            <a:lvl3pPr marL="448193" indent="0">
+              <a:buNone/>
+              <a:defRPr/>
+            </a:lvl3pPr>
+            <a:lvl4pPr marL="672290" indent="0">
+              <a:buNone/>
+              <a:defRPr/>
+            </a:lvl4pPr>
+            <a:lvl5pPr marL="896386" indent="0">
+              <a:buNone/>
+              <a:defRPr/>
+            </a:lvl5pPr>
+          </a:lstStyle>
+          <a:p>
+            <a:pPr lvl="0"/>
+            <a:r>
+              <a:rPr lang="en-US" dirty="0"/>
+              <a:t>Large: subhead Segoe UI Regular 20/24</a:t>
+            </a:r>
+          </a:p>
+        </p:txBody>
+      </p:sp>
+      <p:sp>
+        <p:nvSpPr>
+          <p:cNvPr id="5" name="Text Placeholder 4"/>
+          <p:cNvSpPr>
+            <a:spLocks noGrp="1"/>
+          </p:cNvSpPr>
+          <p:nvPr>
+            <p:ph type="body" sz="quarter" idx="11" hasCustomPrompt="1"/>
+          </p:nvPr>
+        </p:nvSpPr>
+        <p:spPr>
+          <a:xfrm>
+            <a:off x="455995" y="3151388"/>
+            <a:ext cx="11306469" cy="452654"/>
+          </a:xfrm>
+        </p:spPr>
+        <p:txBody>
+          <a:bodyPr lIns="0" tIns="0" rIns="0" bIns="0"/>
+          <a:lstStyle>
+            <a:lvl1pPr marL="0" indent="0">
+              <a:lnSpc>
+                <a:spcPts val="1765"/>
+              </a:lnSpc>
+              <a:spcBef>
+                <a:spcPts val="0"/>
+              </a:spcBef>
+              <a:buNone/>
+              <a:defRPr sz="1372" b="1">
+                <a:solidFill>
+                  <a:schemeClr val="tx1"/>
+                </a:solidFill>
+                <a:latin typeface="+mn-lt"/>
+              </a:defRPr>
+            </a:lvl1pPr>
+            <a:lvl2pPr marL="0" indent="0">
+              <a:lnSpc>
+                <a:spcPts val="1765"/>
+              </a:lnSpc>
+              <a:spcBef>
+                <a:spcPts val="0"/>
+              </a:spcBef>
+              <a:buNone/>
+              <a:defRPr sz="1372">
+                <a:solidFill>
+                  <a:schemeClr val="tx1"/>
+                </a:solidFill>
+              </a:defRPr>
+            </a:lvl2pPr>
+            <a:lvl3pPr marL="448193" indent="0">
+              <a:buNone/>
+              <a:defRPr/>
+            </a:lvl3pPr>
+            <a:lvl4pPr marL="672290" indent="0">
+              <a:buNone/>
+              <a:defRPr/>
+            </a:lvl4pPr>
+            <a:lvl5pPr marL="896386" indent="0">
+              <a:buNone/>
+              <a:defRPr/>
+            </a:lvl5pPr>
+          </a:lstStyle>
+          <a:p>
+            <a:pPr lvl="0"/>
+            <a:r>
+              <a:rPr lang="en-US" dirty="0"/>
+              <a:t>Medium: paragraph title Segoe UI bold 14/18</a:t>
+            </a:r>
+          </a:p>
+          <a:p>
+            <a:pPr lvl="1"/>
+            <a:r>
+              <a:rPr lang="en-US" dirty="0"/>
+              <a:t>Body copy Segoe UI Regular 14/18</a:t>
+            </a:r>
+          </a:p>
+        </p:txBody>
+      </p:sp>
+      <p:sp>
+        <p:nvSpPr>
+          <p:cNvPr id="7" name="Text Placeholder 6"/>
+          <p:cNvSpPr>
+            <a:spLocks noGrp="1"/>
+          </p:cNvSpPr>
+          <p:nvPr>
+            <p:ph type="body" sz="quarter" idx="12" hasCustomPrompt="1"/>
+          </p:nvPr>
+        </p:nvSpPr>
+        <p:spPr>
+          <a:xfrm>
+            <a:off x="455995" y="4390304"/>
+            <a:ext cx="11306469" cy="301770"/>
+          </a:xfrm>
+        </p:spPr>
+        <p:txBody>
+          <a:bodyPr lIns="0" tIns="0" rIns="0" bIns="0"/>
+          <a:lstStyle>
+            <a:lvl1pPr marL="0" indent="0">
+              <a:lnSpc>
+                <a:spcPts val="1176"/>
+              </a:lnSpc>
+              <a:spcBef>
+                <a:spcPts val="0"/>
+              </a:spcBef>
+              <a:buNone/>
+              <a:defRPr sz="980">
+                <a:solidFill>
+                  <a:schemeClr val="tx1"/>
+                </a:solidFill>
+              </a:defRPr>
+            </a:lvl1pPr>
+            <a:lvl2pPr marL="0" indent="0">
+              <a:lnSpc>
+                <a:spcPts val="1176"/>
+              </a:lnSpc>
+              <a:spcBef>
+                <a:spcPts val="0"/>
+              </a:spcBef>
+              <a:buNone/>
+              <a:defRPr sz="980">
+                <a:solidFill>
+                  <a:schemeClr val="tx1"/>
+                </a:solidFill>
+              </a:defRPr>
+            </a:lvl2pPr>
+            <a:lvl3pPr marL="448193" indent="0">
+              <a:buNone/>
+              <a:defRPr/>
+            </a:lvl3pPr>
+            <a:lvl4pPr marL="672290" indent="0">
+              <a:buNone/>
+              <a:defRPr/>
+            </a:lvl4pPr>
+            <a:lvl5pPr marL="896386" indent="0">
+              <a:buNone/>
+              <a:defRPr/>
+            </a:lvl5pPr>
+          </a:lstStyle>
+          <a:p>
+            <a:pPr lvl="0"/>
+            <a:r>
+              <a:rPr lang="en-US" dirty="0"/>
+              <a:t>Small: caption title Segoe </a:t>
+            </a:r>
+            <a:r>
+              <a:rPr lang="en-US" dirty="0" err="1"/>
+              <a:t>Semibold</a:t>
+            </a:r>
+            <a:r>
+              <a:rPr lang="en-US" dirty="0"/>
+              <a:t> 10/12</a:t>
+            </a:r>
+          </a:p>
+          <a:p>
+            <a:pPr lvl="1"/>
+            <a:r>
+              <a:rPr lang="en-US" dirty="0"/>
+              <a:t>Caption Segoe Regular 10/12</a:t>
+            </a:r>
+          </a:p>
+        </p:txBody>
+      </p:sp>
+    </p:spTree>
+    <p:extLst>
+      <p:ext uri="{BB962C8B-B14F-4D97-AF65-F5344CB8AC3E}">
+        <p14:creationId xmlns:p14="http://schemas.microsoft.com/office/powerpoint/2010/main" val="2451914"/>
+      </p:ext>
+    </p:extLst>
+  </p:cSld>
+  <p:clrMapOvr>
+    <a:masterClrMapping/>
+  </p:clrMapOvr>
+  <p:transition>
+    <p:fade/>
+  </p:transition>
+</p:sldLayout>
+</file>
+
 <file path=ppt/slideLayouts/slideLayout3.xml><?xml version="1.0" encoding="utf-8"?>
 <p:sldLayout xmlns:a="http://schemas.openxmlformats.org/drawingml/2006/main" xmlns:r="http://schemas.openxmlformats.org/officeDocument/2006/relationships" xmlns:p="http://schemas.openxmlformats.org/presentationml/2006/main" preserve="1" userDrawn="1">
   <p:cSld name="Agenda">
@@ -6438,6 +7387,7 @@
     <p:sldLayoutId id="2147483674" r:id="rId17"/>
     <p:sldLayoutId id="2147483675" r:id="rId18"/>
     <p:sldLayoutId id="2147483676" r:id="rId19"/>
+    <p:sldLayoutId id="2147483678" r:id="rId20"/>
   </p:sldLayoutIdLst>
   <p:txStyles>
     <p:titleStyle>
@@ -9340,30 +10290,8 @@
             </a:pPr>
             <a:r>
               <a:rPr lang="en-US" dirty="0"/>
-              <a:t>Search commands</a:t>
-            </a:r>
-          </a:p>
-          <a:p>
-            <a:pPr>
-              <a:spcBef>
-                <a:spcPts val="1200"/>
-              </a:spcBef>
-            </a:pPr>
-            <a:endParaRPr lang="en-US" dirty="0"/>
-          </a:p>
-          <a:p>
-            <a:pPr>
-              <a:spcBef>
-                <a:spcPts val="1200"/>
-              </a:spcBef>
-            </a:pPr>
-            <a:r>
-              <a:rPr lang="en-US" dirty="0"/>
-              <a:t>Creating search commands</a:t>
-            </a:r>
-          </a:p>
-          <a:p>
-            <a:endParaRPr lang="en-US" dirty="0"/>
+              <a:t>Link unfurling</a:t>
+            </a:r>
           </a:p>
         </p:txBody>
       </p:sp>
@@ -9506,7 +10434,7 @@
           <p:cNvPr id="2" name="Title 1">
             <a:extLst>
               <a:ext uri="{FF2B5EF4-FFF2-40B4-BE49-F238E27FC236}">
-                <a16:creationId xmlns:a16="http://schemas.microsoft.com/office/drawing/2014/main" id="{AB8F3705-C286-1A41-8E47-CDC697C29901}"/>
+                <a16:creationId xmlns:a16="http://schemas.microsoft.com/office/drawing/2014/main" id="{4898AE09-FBA4-3B42-9801-43D84E480C4E}"/>
               </a:ext>
             </a:extLst>
           </p:cNvPr>
@@ -9517,24 +10445,31 @@
             <p:ph type="title"/>
           </p:nvPr>
         </p:nvSpPr>
-        <p:spPr/>
+        <p:spPr>
+          <a:xfrm>
+            <a:off x="838200" y="365125"/>
+            <a:ext cx="10515600" cy="1325563"/>
+          </a:xfrm>
+        </p:spPr>
         <p:txBody>
-          <a:bodyPr/>
+          <a:bodyPr anchor="ctr">
+            <a:normAutofit/>
+          </a:bodyPr>
           <a:lstStyle/>
           <a:p>
             <a:r>
               <a:rPr lang="en-US" dirty="0"/>
-              <a:t>What are search commands?</a:t>
+              <a:t>What is link unfurling?</a:t>
             </a:r>
           </a:p>
         </p:txBody>
       </p:sp>
       <p:sp>
         <p:nvSpPr>
-          <p:cNvPr id="3" name="Content Placeholder 2">
-            <a:extLst>
-              <a:ext uri="{FF2B5EF4-FFF2-40B4-BE49-F238E27FC236}">
-                <a16:creationId xmlns:a16="http://schemas.microsoft.com/office/drawing/2014/main" id="{A74FC1C3-47FF-504D-B83A-4C5AD8E3D98C}"/>
+          <p:cNvPr id="3" name="Text Placeholder 2">
+            <a:extLst>
+              <a:ext uri="{FF2B5EF4-FFF2-40B4-BE49-F238E27FC236}">
+                <a16:creationId xmlns:a16="http://schemas.microsoft.com/office/drawing/2014/main" id="{217639AE-2A56-1844-9AF6-BBDA481488AF}"/>
               </a:ext>
             </a:extLst>
           </p:cNvPr>
@@ -9542,64 +10477,59 @@
             <a:spLocks noGrp="1"/>
           </p:cNvSpPr>
           <p:nvPr>
-            <p:ph idx="1"/>
+            <p:ph sz="half" idx="1"/>
           </p:nvPr>
         </p:nvSpPr>
         <p:spPr>
           <a:xfrm>
             <a:off x="838200" y="1825625"/>
-            <a:ext cx="5257800" cy="4006215"/>
+            <a:ext cx="5181600" cy="4254801"/>
           </a:xfrm>
         </p:spPr>
         <p:txBody>
           <a:bodyPr>
-            <a:normAutofit fontScale="77500" lnSpcReduction="20000"/>
+            <a:normAutofit/>
           </a:bodyPr>
           <a:lstStyle/>
           <a:p>
             <a:r>
-              <a:rPr lang="en-US" dirty="0"/>
-              <a:t>Action commands enable users to search an external system for information</a:t>
-            </a:r>
-          </a:p>
-          <a:p>
-            <a:endParaRPr lang="en-US" dirty="0"/>
-          </a:p>
-          <a:p>
-            <a:r>
-              <a:rPr lang="en-US" dirty="0"/>
-              <a:t>Search query is sent from Microsoft Teams to your web service</a:t>
-            </a:r>
-          </a:p>
-          <a:p>
-            <a:endParaRPr lang="en-US" dirty="0"/>
-          </a:p>
-          <a:p>
-            <a:r>
-              <a:rPr lang="en-US" dirty="0"/>
-              <a:t>Your web service responds with a list or grid of results</a:t>
-            </a:r>
-          </a:p>
-          <a:p>
-            <a:endParaRPr lang="en-US" dirty="0"/>
-          </a:p>
-          <a:p>
-            <a:r>
-              <a:rPr lang="en-US" dirty="0"/>
-              <a:t>When a user selects a result, it is added to the compose message box as a card or text</a:t>
-            </a:r>
-          </a:p>
-          <a:p>
-            <a:endParaRPr lang="en-US" dirty="0"/>
+              <a:rPr lang="en-US" sz="2400" dirty="0"/>
+              <a:t>Configure your messaging extension to watch for specific URLs in the compose message box</a:t>
+            </a:r>
+          </a:p>
+          <a:p>
+            <a:endParaRPr lang="en-US" sz="2400" dirty="0"/>
+          </a:p>
+          <a:p>
+            <a:r>
+              <a:rPr lang="en-US" sz="2400" dirty="0"/>
+              <a:t>When a registered domain is detected, the message is sent to your web service</a:t>
+            </a:r>
+          </a:p>
+          <a:p>
+            <a:endParaRPr lang="en-US" sz="2400" dirty="0"/>
+          </a:p>
+          <a:p>
+            <a:r>
+              <a:rPr lang="en-US" sz="2400" dirty="0"/>
+              <a:t>Web service responds with a richly </a:t>
+            </a:r>
+            <a:br>
+              <a:rPr lang="en-US" sz="2400" dirty="0"/>
+            </a:br>
+            <a:r>
+              <a:rPr lang="en-US" sz="2400" dirty="0"/>
+              <a:t>formatted card, similar to search results</a:t>
+            </a:r>
           </a:p>
         </p:txBody>
       </p:sp>
       <p:pic>
         <p:nvPicPr>
-          <p:cNvPr id="4" name="Picture 3">
-            <a:extLst>
-              <a:ext uri="{FF2B5EF4-FFF2-40B4-BE49-F238E27FC236}">
-                <a16:creationId xmlns:a16="http://schemas.microsoft.com/office/drawing/2014/main" id="{E2ACB7C0-7F89-4940-B345-907405434596}"/>
+          <p:cNvPr id="6" name="Picture 5">
+            <a:extLst>
+              <a:ext uri="{FF2B5EF4-FFF2-40B4-BE49-F238E27FC236}">
+                <a16:creationId xmlns:a16="http://schemas.microsoft.com/office/drawing/2014/main" id="{0B886EB5-938D-484C-AB85-6C0980F6D2DD}"/>
               </a:ext>
             </a:extLst>
           </p:cNvPr>
@@ -9609,25 +10539,26 @@
           <p:nvPr/>
         </p:nvPicPr>
         <p:blipFill>
-          <a:blip r:embed="rId2"/>
+          <a:blip r:embed="rId3"/>
           <a:stretch>
             <a:fillRect/>
           </a:stretch>
         </p:blipFill>
         <p:spPr>
           <a:xfrm>
-            <a:off x="7346602" y="1456266"/>
-            <a:ext cx="4007198" cy="4510093"/>
+            <a:off x="6172200" y="2845459"/>
+            <a:ext cx="5181600" cy="2215133"/>
           </a:xfrm>
           <a:prstGeom prst="rect">
             <a:avLst/>
           </a:prstGeom>
+          <a:noFill/>
         </p:spPr>
       </p:pic>
     </p:spTree>
     <p:extLst>
       <p:ext uri="{BB962C8B-B14F-4D97-AF65-F5344CB8AC3E}">
-        <p14:creationId xmlns:p14="http://schemas.microsoft.com/office/powerpoint/2010/main" val="1412681978"/>
+        <p14:creationId xmlns:p14="http://schemas.microsoft.com/office/powerpoint/2010/main" val="1902842933"/>
       </p:ext>
     </p:extLst>
   </p:cSld>
@@ -9659,7 +10590,7 @@
           <p:cNvPr id="2" name="Title 1">
             <a:extLst>
               <a:ext uri="{FF2B5EF4-FFF2-40B4-BE49-F238E27FC236}">
-                <a16:creationId xmlns:a16="http://schemas.microsoft.com/office/drawing/2014/main" id="{83E10B2D-B6E2-0C48-B1C7-5A084A825815}"/>
+                <a16:creationId xmlns:a16="http://schemas.microsoft.com/office/drawing/2014/main" id="{34D247C1-15C4-FD4F-9783-FB2CF5FE1E93}"/>
               </a:ext>
             </a:extLst>
           </p:cNvPr>
@@ -9677,17 +10608,17 @@
           <a:p>
             <a:r>
               <a:rPr lang="en-US" dirty="0"/>
-              <a:t>Register search command messaging extensions in the app manifest</a:t>
+              <a:t>Register link unfurling messaging extensions in the app manifest</a:t>
             </a:r>
           </a:p>
         </p:txBody>
       </p:sp>
       <p:sp>
         <p:nvSpPr>
-          <p:cNvPr id="3" name="Content Placeholder 2">
-            <a:extLst>
-              <a:ext uri="{FF2B5EF4-FFF2-40B4-BE49-F238E27FC236}">
-                <a16:creationId xmlns:a16="http://schemas.microsoft.com/office/drawing/2014/main" id="{51A4222F-0474-BF45-92E1-F0A6F7567A0C}"/>
+          <p:cNvPr id="3" name="Text Placeholder 2">
+            <a:extLst>
+              <a:ext uri="{FF2B5EF4-FFF2-40B4-BE49-F238E27FC236}">
+                <a16:creationId xmlns:a16="http://schemas.microsoft.com/office/drawing/2014/main" id="{3CDE8A75-CEF7-AE48-9FCC-B1AB72311C56}"/>
               </a:ext>
             </a:extLst>
           </p:cNvPr>
@@ -9701,29 +10632,26 @@
         <p:spPr/>
         <p:txBody>
           <a:bodyPr>
-            <a:normAutofit fontScale="47500" lnSpcReduction="20000"/>
+            <a:normAutofit lnSpcReduction="10000"/>
           </a:bodyPr>
           <a:lstStyle/>
           <a:p>
-            <a:pPr marL="0" indent="0">
-              <a:buNone/>
-            </a:pPr>
-            <a:r>
-              <a:rPr lang="en-US" dirty="0">
+            <a:r>
+              <a:rPr lang="en-US" sz="1568" dirty="0">
                 <a:latin typeface="Courier New" panose="02070309020205020404" pitchFamily="49" charset="0"/>
                 <a:cs typeface="Courier New" panose="02070309020205020404" pitchFamily="49" charset="0"/>
               </a:rPr>
               <a:t>"</a:t>
             </a:r>
             <a:r>
-              <a:rPr lang="en-US" dirty="0" err="1">
+              <a:rPr lang="en-US" sz="1568" dirty="0" err="1">
                 <a:latin typeface="Courier New" panose="02070309020205020404" pitchFamily="49" charset="0"/>
                 <a:cs typeface="Courier New" panose="02070309020205020404" pitchFamily="49" charset="0"/>
               </a:rPr>
               <a:t>composeExtensions</a:t>
             </a:r>
             <a:r>
-              <a:rPr lang="en-US" dirty="0">
+              <a:rPr lang="en-US" sz="1568" dirty="0">
                 <a:latin typeface="Courier New" panose="02070309020205020404" pitchFamily="49" charset="0"/>
                 <a:cs typeface="Courier New" panose="02070309020205020404" pitchFamily="49" charset="0"/>
               </a:rPr>
@@ -9731,11 +10659,8 @@
             </a:r>
           </a:p>
           <a:p>
-            <a:pPr marL="0" indent="0">
-              <a:buNone/>
-            </a:pPr>
-            <a:r>
-              <a:rPr lang="en-US" dirty="0">
+            <a:r>
+              <a:rPr lang="en-US" sz="1568" dirty="0">
                 <a:latin typeface="Courier New" panose="02070309020205020404" pitchFamily="49" charset="0"/>
                 <a:cs typeface="Courier New" panose="02070309020205020404" pitchFamily="49" charset="0"/>
               </a:rPr>
@@ -9743,25 +10668,22 @@
             </a:r>
           </a:p>
           <a:p>
-            <a:pPr marL="0" indent="0">
-              <a:buNone/>
-            </a:pPr>
-            <a:r>
-              <a:rPr lang="en-US" dirty="0">
+            <a:r>
+              <a:rPr lang="en-US" sz="1568" dirty="0">
                 <a:latin typeface="Courier New" panose="02070309020205020404" pitchFamily="49" charset="0"/>
                 <a:cs typeface="Courier New" panose="02070309020205020404" pitchFamily="49" charset="0"/>
               </a:rPr>
               <a:t>    "</a:t>
             </a:r>
             <a:r>
-              <a:rPr lang="en-US" dirty="0" err="1">
+              <a:rPr lang="en-US" sz="1568" dirty="0" err="1">
                 <a:latin typeface="Courier New" panose="02070309020205020404" pitchFamily="49" charset="0"/>
                 <a:cs typeface="Courier New" panose="02070309020205020404" pitchFamily="49" charset="0"/>
               </a:rPr>
               <a:t>botId</a:t>
             </a:r>
             <a:r>
-              <a:rPr lang="en-US" dirty="0">
+              <a:rPr lang="en-US" sz="1568" dirty="0">
                 <a:latin typeface="Courier New" panose="02070309020205020404" pitchFamily="49" charset="0"/>
                 <a:cs typeface="Courier New" panose="02070309020205020404" pitchFamily="49" charset="0"/>
               </a:rPr>
@@ -9769,25 +10691,22 @@
             </a:r>
           </a:p>
           <a:p>
-            <a:pPr marL="0" indent="0">
-              <a:buNone/>
-            </a:pPr>
-            <a:r>
-              <a:rPr lang="en-US" dirty="0">
+            <a:r>
+              <a:rPr lang="en-US" sz="1568" dirty="0">
                 <a:latin typeface="Courier New" panose="02070309020205020404" pitchFamily="49" charset="0"/>
                 <a:cs typeface="Courier New" panose="02070309020205020404" pitchFamily="49" charset="0"/>
               </a:rPr>
               <a:t>    "</a:t>
             </a:r>
             <a:r>
-              <a:rPr lang="en-US" dirty="0" err="1">
+              <a:rPr lang="en-US" sz="1568" dirty="0" err="1">
                 <a:latin typeface="Courier New" panose="02070309020205020404" pitchFamily="49" charset="0"/>
                 <a:cs typeface="Courier New" panose="02070309020205020404" pitchFamily="49" charset="0"/>
               </a:rPr>
               <a:t>canUpdateConfiguration</a:t>
             </a:r>
             <a:r>
-              <a:rPr lang="en-US" dirty="0">
+              <a:rPr lang="en-US" sz="1568" dirty="0">
                 <a:latin typeface="Courier New" panose="02070309020205020404" pitchFamily="49" charset="0"/>
                 <a:cs typeface="Courier New" panose="02070309020205020404" pitchFamily="49" charset="0"/>
               </a:rPr>
@@ -9795,23 +10714,31 @@
             </a:r>
           </a:p>
           <a:p>
-            <a:pPr marL="0" indent="0">
-              <a:buNone/>
-            </a:pPr>
-            <a:r>
-              <a:rPr lang="en-US" dirty="0">
-                <a:latin typeface="Courier New" panose="02070309020205020404" pitchFamily="49" charset="0"/>
-                <a:cs typeface="Courier New" panose="02070309020205020404" pitchFamily="49" charset="0"/>
-              </a:rPr>
-              <a:t>    "commands": [</a:t>
-            </a:r>
-          </a:p>
-          <a:p>
-            <a:pPr marL="0" indent="0">
-              <a:buNone/>
-            </a:pPr>
-            <a:r>
-              <a:rPr lang="en-US" dirty="0">
+            <a:r>
+              <a:rPr lang="en-US" sz="1568" dirty="0">
+                <a:latin typeface="Courier New" panose="02070309020205020404" pitchFamily="49" charset="0"/>
+                <a:cs typeface="Courier New" panose="02070309020205020404" pitchFamily="49" charset="0"/>
+              </a:rPr>
+              <a:t>    ”</a:t>
+            </a:r>
+            <a:r>
+              <a:rPr lang="en-US" sz="1568" dirty="0" err="1">
+                <a:latin typeface="Courier New" panose="02070309020205020404" pitchFamily="49" charset="0"/>
+                <a:cs typeface="Courier New" panose="02070309020205020404" pitchFamily="49" charset="0"/>
+              </a:rPr>
+              <a:t>messageHandlers</a:t>
+            </a:r>
+            <a:r>
+              <a:rPr lang="en-US" sz="1568" dirty="0">
+                <a:latin typeface="Courier New" panose="02070309020205020404" pitchFamily="49" charset="0"/>
+                <a:cs typeface="Courier New" panose="02070309020205020404" pitchFamily="49" charset="0"/>
+              </a:rPr>
+              <a:t>": [</a:t>
+            </a:r>
+          </a:p>
+          <a:p>
+            <a:r>
+              <a:rPr lang="en-US" sz="1568" dirty="0">
                 <a:latin typeface="Courier New" panose="02070309020205020404" pitchFamily="49" charset="0"/>
                 <a:cs typeface="Courier New" panose="02070309020205020404" pitchFamily="49" charset="0"/>
               </a:rPr>
@@ -9819,123 +10746,40 @@
             </a:r>
           </a:p>
           <a:p>
-            <a:pPr marL="0" indent="0">
-              <a:buNone/>
-            </a:pPr>
-            <a:r>
-              <a:rPr lang="en-US" dirty="0">
-                <a:latin typeface="Courier New" panose="02070309020205020404" pitchFamily="49" charset="0"/>
-                <a:cs typeface="Courier New" panose="02070309020205020404" pitchFamily="49" charset="0"/>
-              </a:rPr>
-              <a:t>        "id": "</a:t>
-            </a:r>
-            <a:r>
-              <a:rPr lang="en-US" dirty="0" err="1">
-                <a:latin typeface="Courier New" panose="02070309020205020404" pitchFamily="49" charset="0"/>
-                <a:cs typeface="Courier New" panose="02070309020205020404" pitchFamily="49" charset="0"/>
-              </a:rPr>
-              <a:t>planetExpanderSearch</a:t>
-            </a:r>
-            <a:r>
-              <a:rPr lang="en-US" dirty="0">
-                <a:latin typeface="Courier New" panose="02070309020205020404" pitchFamily="49" charset="0"/>
-                <a:cs typeface="Courier New" panose="02070309020205020404" pitchFamily="49" charset="0"/>
-              </a:rPr>
-              <a:t>",</a:t>
-            </a:r>
-          </a:p>
-          <a:p>
-            <a:pPr marL="0" indent="0">
-              <a:buNone/>
-            </a:pPr>
-            <a:r>
-              <a:rPr lang="en-US" dirty="0">
-                <a:latin typeface="Courier New" panose="02070309020205020404" pitchFamily="49" charset="0"/>
-                <a:cs typeface="Courier New" panose="02070309020205020404" pitchFamily="49" charset="0"/>
-              </a:rPr>
-              <a:t>        "type": ”search",</a:t>
-            </a:r>
-          </a:p>
-          <a:p>
-            <a:pPr marL="0" indent="0">
-              <a:buNone/>
-            </a:pPr>
-            <a:r>
-              <a:rPr lang="en-US" dirty="0">
-                <a:latin typeface="Courier New" panose="02070309020205020404" pitchFamily="49" charset="0"/>
-                <a:cs typeface="Courier New" panose="02070309020205020404" pitchFamily="49" charset="0"/>
-              </a:rPr>
-              <a:t>        "title": "Planet Lookup",</a:t>
-            </a:r>
-          </a:p>
-          <a:p>
-            <a:pPr marL="0" indent="0">
-              <a:buNone/>
-            </a:pPr>
-            <a:r>
-              <a:rPr lang="en-US" dirty="0">
-                <a:latin typeface="Courier New" panose="02070309020205020404" pitchFamily="49" charset="0"/>
-                <a:cs typeface="Courier New" panose="02070309020205020404" pitchFamily="49" charset="0"/>
-              </a:rPr>
-              <a:t>        "description": ”Search for a planet.",</a:t>
-            </a:r>
-          </a:p>
-          <a:p>
-            <a:pPr marL="0" indent="0">
-              <a:buNone/>
-            </a:pPr>
-            <a:r>
-              <a:rPr lang="en-US" dirty="0">
-                <a:latin typeface="Courier New" panose="02070309020205020404" pitchFamily="49" charset="0"/>
-                <a:cs typeface="Courier New" panose="02070309020205020404" pitchFamily="49" charset="0"/>
-              </a:rPr>
-              <a:t>        "context": [ "compose"],</a:t>
-            </a:r>
-          </a:p>
-          <a:p>
-            <a:pPr marL="0" indent="0">
-              <a:buNone/>
-            </a:pPr>
-            <a:r>
-              <a:rPr lang="en-US" dirty="0">
-                <a:latin typeface="Courier New" panose="02070309020205020404" pitchFamily="49" charset="0"/>
-                <a:cs typeface="Courier New" panose="02070309020205020404" pitchFamily="49" charset="0"/>
-              </a:rPr>
-              <a:t>        "parameters": [{ title: “Planet”, name: ”</a:t>
-            </a:r>
-            <a:r>
-              <a:rPr lang="en-US" dirty="0" err="1">
-                <a:latin typeface="Courier New" panose="02070309020205020404" pitchFamily="49" charset="0"/>
-                <a:cs typeface="Courier New" panose="02070309020205020404" pitchFamily="49" charset="0"/>
-              </a:rPr>
-              <a:t>searchKeyword</a:t>
-            </a:r>
-            <a:r>
-              <a:rPr lang="en-US" dirty="0">
-                <a:latin typeface="Courier New" panose="02070309020205020404" pitchFamily="49" charset="0"/>
-                <a:cs typeface="Courier New" panose="02070309020205020404" pitchFamily="49" charset="0"/>
-              </a:rPr>
-              <a:t>”,</a:t>
-            </a:r>
-          </a:p>
-          <a:p>
-            <a:pPr marL="0" indent="0">
-              <a:buNone/>
-            </a:pPr>
-            <a:r>
-              <a:rPr lang="en-US" dirty="0">
-                <a:latin typeface="Courier New" panose="02070309020205020404" pitchFamily="49" charset="0"/>
-                <a:cs typeface="Courier New" panose="02070309020205020404" pitchFamily="49" charset="0"/>
-              </a:rPr>
-              <a:t>                         description: ”Enter ‘inner’, ‘outer’, or the name of a planet” }],</a:t>
-            </a:r>
-          </a:p>
-          <a:p>
-            <a:pPr marL="0" indent="0">
-              <a:buNone/>
-            </a:pPr>
-            <a:r>
-              <a:rPr lang="en-US" dirty="0">
+            <a:r>
+              <a:rPr lang="en-US" sz="1568" dirty="0">
+                <a:latin typeface="Courier New" panose="02070309020205020404" pitchFamily="49" charset="0"/>
+                <a:cs typeface="Courier New" panose="02070309020205020404" pitchFamily="49" charset="0"/>
+              </a:rPr>
+              <a:t>        "type": ”link",</a:t>
+            </a:r>
+          </a:p>
+          <a:p>
+            <a:r>
+              <a:rPr lang="en-US" sz="1568" dirty="0">
+                <a:latin typeface="Courier New" panose="02070309020205020404" pitchFamily="49" charset="0"/>
+                <a:cs typeface="Courier New" panose="02070309020205020404" pitchFamily="49" charset="0"/>
+              </a:rPr>
+              <a:t>        ”type": { “domains”: [ ”*.</a:t>
+            </a:r>
+            <a:r>
+              <a:rPr lang="en-US" sz="1568" dirty="0" err="1">
+                <a:latin typeface="Courier New" panose="02070309020205020404" pitchFamily="49" charset="0"/>
+                <a:cs typeface="Courier New" panose="02070309020205020404" pitchFamily="49" charset="0"/>
+              </a:rPr>
+              <a:t>wikipedia.org</a:t>
+            </a:r>
+            <a:r>
+              <a:rPr lang="en-US" sz="1568" dirty="0">
+                <a:latin typeface="Courier New" panose="02070309020205020404" pitchFamily="49" charset="0"/>
+                <a:cs typeface="Courier New" panose="02070309020205020404" pitchFamily="49" charset="0"/>
+              </a:rPr>
+              <a:t>"]</a:t>
+            </a:r>
+          </a:p>
+          <a:p>
+            <a:r>
+              <a:rPr lang="en-US" sz="1568" dirty="0">
                 <a:latin typeface="Courier New" panose="02070309020205020404" pitchFamily="49" charset="0"/>
                 <a:cs typeface="Courier New" panose="02070309020205020404" pitchFamily="49" charset="0"/>
               </a:rPr>
@@ -9943,11 +10787,8 @@
             </a:r>
           </a:p>
           <a:p>
-            <a:pPr marL="0" indent="0">
-              <a:buNone/>
-            </a:pPr>
-            <a:r>
-              <a:rPr lang="en-US" dirty="0">
+            <a:r>
+              <a:rPr lang="en-US" sz="1568" dirty="0">
                 <a:latin typeface="Courier New" panose="02070309020205020404" pitchFamily="49" charset="0"/>
                 <a:cs typeface="Courier New" panose="02070309020205020404" pitchFamily="49" charset="0"/>
               </a:rPr>
@@ -9955,26 +10796,66 @@
             </a:r>
           </a:p>
           <a:p>
-            <a:pPr marL="0" indent="0">
-              <a:buNone/>
-            </a:pPr>
-            <a:r>
-              <a:rPr lang="en-US" dirty="0">
-                <a:latin typeface="Courier New" panose="02070309020205020404" pitchFamily="49" charset="0"/>
-                <a:cs typeface="Courier New" panose="02070309020205020404" pitchFamily="49" charset="0"/>
-              </a:rPr>
-              <a:t>   }]</a:t>
-            </a:r>
-          </a:p>
-          <a:p>
-            <a:endParaRPr lang="en-US" dirty="0"/>
+            <a:r>
+              <a:rPr lang="en-US" sz="1568" dirty="0">
+                <a:latin typeface="Courier New" panose="02070309020205020404" pitchFamily="49" charset="0"/>
+                <a:cs typeface="Courier New" panose="02070309020205020404" pitchFamily="49" charset="0"/>
+              </a:rPr>
+              <a:t>   }</a:t>
+            </a:r>
+          </a:p>
+          <a:p>
+            <a:r>
+              <a:rPr lang="en-US" sz="1568" dirty="0">
+                <a:latin typeface="Courier New" panose="02070309020205020404" pitchFamily="49" charset="0"/>
+                <a:cs typeface="Courier New" panose="02070309020205020404" pitchFamily="49" charset="0"/>
+              </a:rPr>
+              <a:t>],</a:t>
+            </a:r>
+          </a:p>
+          <a:p>
+            <a:r>
+              <a:rPr lang="en-US" sz="1568" dirty="0">
+                <a:latin typeface="Courier New" panose="02070309020205020404" pitchFamily="49" charset="0"/>
+                <a:cs typeface="Courier New" panose="02070309020205020404" pitchFamily="49" charset="0"/>
+              </a:rPr>
+              <a:t>“</a:t>
+            </a:r>
+            <a:r>
+              <a:rPr lang="en-US" sz="1568" dirty="0" err="1">
+                <a:latin typeface="Courier New" panose="02070309020205020404" pitchFamily="49" charset="0"/>
+                <a:cs typeface="Courier New" panose="02070309020205020404" pitchFamily="49" charset="0"/>
+              </a:rPr>
+              <a:t>validDomains</a:t>
+            </a:r>
+            <a:r>
+              <a:rPr lang="en-US" sz="1568" dirty="0">
+                <a:latin typeface="Courier New" panose="02070309020205020404" pitchFamily="49" charset="0"/>
+                <a:cs typeface="Courier New" panose="02070309020205020404" pitchFamily="49" charset="0"/>
+              </a:rPr>
+              <a:t>”: [ “{{HOSTNAME}}”, “*.</a:t>
+            </a:r>
+            <a:r>
+              <a:rPr lang="en-US" sz="1568" dirty="0" err="1">
+                <a:latin typeface="Courier New" panose="02070309020205020404" pitchFamily="49" charset="0"/>
+                <a:cs typeface="Courier New" panose="02070309020205020404" pitchFamily="49" charset="0"/>
+              </a:rPr>
+              <a:t>wikipedia.org</a:t>
+            </a:r>
+            <a:r>
+              <a:rPr lang="en-US" sz="1568" dirty="0">
+                <a:latin typeface="Courier New" panose="02070309020205020404" pitchFamily="49" charset="0"/>
+                <a:cs typeface="Courier New" panose="02070309020205020404" pitchFamily="49" charset="0"/>
+              </a:rPr>
+              <a:t>”]</a:t>
+            </a:r>
           </a:p>
         </p:txBody>
       </p:sp>
     </p:spTree>
     <p:extLst>
       <p:ext uri="{BB962C8B-B14F-4D97-AF65-F5344CB8AC3E}">
-        <p14:creationId xmlns:p14="http://schemas.microsoft.com/office/powerpoint/2010/main" val="1839815955"/>
+        <p14:creationId xmlns:p14="http://schemas.microsoft.com/office/powerpoint/2010/main" val="3932374412"/>
       </p:ext>
     </p:extLst>
   </p:cSld>
@@ -10006,7 +10887,7 @@
           <p:cNvPr id="2" name="Title 1">
             <a:extLst>
               <a:ext uri="{FF2B5EF4-FFF2-40B4-BE49-F238E27FC236}">
-                <a16:creationId xmlns:a16="http://schemas.microsoft.com/office/drawing/2014/main" id="{4E4497EF-9D69-BA46-BF2D-B93435549C36}"/>
+                <a16:creationId xmlns:a16="http://schemas.microsoft.com/office/drawing/2014/main" id="{34D247C1-15C4-FD4F-9783-FB2CF5FE1E93}"/>
               </a:ext>
             </a:extLst>
           </p:cNvPr>
@@ -10024,17 +10905,17 @@
           <a:p>
             <a:r>
               <a:rPr lang="en-US" dirty="0"/>
-              <a:t>Responding to search command queries</a:t>
+              <a:t>Responding to message handler invocation</a:t>
             </a:r>
           </a:p>
         </p:txBody>
       </p:sp>
       <p:sp>
         <p:nvSpPr>
-          <p:cNvPr id="3" name="Content Placeholder 2">
-            <a:extLst>
-              <a:ext uri="{FF2B5EF4-FFF2-40B4-BE49-F238E27FC236}">
-                <a16:creationId xmlns:a16="http://schemas.microsoft.com/office/drawing/2014/main" id="{A254054B-4B17-CB49-A28C-0310B6D23CB6}"/>
+          <p:cNvPr id="3" name="Text Placeholder 2">
+            <a:extLst>
+              <a:ext uri="{FF2B5EF4-FFF2-40B4-BE49-F238E27FC236}">
+                <a16:creationId xmlns:a16="http://schemas.microsoft.com/office/drawing/2014/main" id="{3CDE8A75-CEF7-AE48-9FCC-B1AB72311C56}"/>
               </a:ext>
             </a:extLst>
           </p:cNvPr>
@@ -10048,43 +10929,40 @@
         <p:spPr/>
         <p:txBody>
           <a:bodyPr>
-            <a:normAutofit fontScale="55000" lnSpcReduction="20000"/>
+            <a:normAutofit fontScale="77500" lnSpcReduction="20000"/>
           </a:bodyPr>
           <a:lstStyle/>
           <a:p>
-            <a:pPr marL="0" indent="0">
-              <a:buNone/>
-            </a:pPr>
-            <a:r>
-              <a:rPr lang="en-US" dirty="0">
+            <a:r>
+              <a:rPr lang="en-US" sz="1568" dirty="0">
                 <a:latin typeface="Courier New" panose="02070309020205020404" pitchFamily="49" charset="0"/>
                 <a:cs typeface="Courier New" panose="02070309020205020404" pitchFamily="49" charset="0"/>
               </a:rPr>
               <a:t>export class </a:t>
             </a:r>
             <a:r>
-              <a:rPr lang="en-US" dirty="0" err="1">
+              <a:rPr lang="en-US" sz="1568" dirty="0" err="1">
                 <a:latin typeface="Courier New" panose="02070309020205020404" pitchFamily="49" charset="0"/>
                 <a:cs typeface="Courier New" panose="02070309020205020404" pitchFamily="49" charset="0"/>
               </a:rPr>
               <a:t>PlanetBot</a:t>
             </a:r>
             <a:r>
-              <a:rPr lang="en-US" dirty="0">
+              <a:rPr lang="en-US" sz="1568" dirty="0">
                 <a:latin typeface="Courier New" panose="02070309020205020404" pitchFamily="49" charset="0"/>
                 <a:cs typeface="Courier New" panose="02070309020205020404" pitchFamily="49" charset="0"/>
               </a:rPr>
               <a:t> extends </a:t>
             </a:r>
             <a:r>
-              <a:rPr lang="en-US" dirty="0" err="1">
+              <a:rPr lang="en-US" sz="1568" dirty="0" err="1">
                 <a:latin typeface="Courier New" panose="02070309020205020404" pitchFamily="49" charset="0"/>
                 <a:cs typeface="Courier New" panose="02070309020205020404" pitchFamily="49" charset="0"/>
               </a:rPr>
               <a:t>TeamsActivityHandler</a:t>
             </a:r>
             <a:r>
-              <a:rPr lang="en-US" dirty="0">
+              <a:rPr lang="en-US" sz="1568" dirty="0">
                 <a:latin typeface="Courier New" panose="02070309020205020404" pitchFamily="49" charset="0"/>
                 <a:cs typeface="Courier New" panose="02070309020205020404" pitchFamily="49" charset="0"/>
               </a:rPr>
@@ -10092,52 +10970,123 @@
             </a:r>
           </a:p>
           <a:p>
-            <a:pPr marL="0" indent="0">
-              <a:buNone/>
-            </a:pPr>
-            <a:r>
-              <a:rPr lang="en-US" dirty="0">
+            <a:r>
+              <a:rPr lang="en-US" sz="1568" i="1" dirty="0">
+                <a:latin typeface="Courier New" panose="02070309020205020404" pitchFamily="49" charset="0"/>
+                <a:cs typeface="Courier New" panose="02070309020205020404" pitchFamily="49" charset="0"/>
+              </a:rPr>
+              <a:t>  // handle the Activity type = “</a:t>
+            </a:r>
+            <a:r>
+              <a:rPr lang="en-US" sz="1568" i="1" dirty="0" err="1">
+                <a:latin typeface="Courier New" panose="02070309020205020404" pitchFamily="49" charset="0"/>
+                <a:cs typeface="Courier New" panose="02070309020205020404" pitchFamily="49" charset="0"/>
+              </a:rPr>
+              <a:t>composeExtension</a:t>
+            </a:r>
+            <a:r>
+              <a:rPr lang="en-US" sz="1568" i="1" dirty="0">
+                <a:latin typeface="Courier New" panose="02070309020205020404" pitchFamily="49" charset="0"/>
+                <a:cs typeface="Courier New" panose="02070309020205020404" pitchFamily="49" charset="0"/>
+              </a:rPr>
+              <a:t>/</a:t>
+            </a:r>
+            <a:r>
+              <a:rPr lang="en-US" sz="1568" i="1" dirty="0" err="1">
+                <a:latin typeface="Courier New" panose="02070309020205020404" pitchFamily="49" charset="0"/>
+                <a:cs typeface="Courier New" panose="02070309020205020404" pitchFamily="49" charset="0"/>
+              </a:rPr>
+              <a:t>queryLink</a:t>
+            </a:r>
+            <a:r>
+              <a:rPr lang="en-US" sz="1568" i="1" dirty="0">
+                <a:latin typeface="Courier New" panose="02070309020205020404" pitchFamily="49" charset="0"/>
+                <a:cs typeface="Courier New" panose="02070309020205020404" pitchFamily="49" charset="0"/>
+              </a:rPr>
+              <a:t>”</a:t>
+            </a:r>
+            <a:endParaRPr lang="en-US" sz="1568" dirty="0">
+              <a:latin typeface="Courier New" panose="02070309020205020404" pitchFamily="49" charset="0"/>
+              <a:cs typeface="Courier New" panose="02070309020205020404" pitchFamily="49" charset="0"/>
+            </a:endParaRPr>
+          </a:p>
+          <a:p>
+            <a:r>
+              <a:rPr lang="en-US" sz="1568" dirty="0">
                 <a:latin typeface="Courier New" panose="02070309020205020404" pitchFamily="49" charset="0"/>
                 <a:cs typeface="Courier New" panose="02070309020205020404" pitchFamily="49" charset="0"/>
               </a:rPr>
               <a:t>  protected </a:t>
             </a:r>
             <a:r>
-              <a:rPr lang="en-US" dirty="0" err="1">
-                <a:latin typeface="Courier New" panose="02070309020205020404" pitchFamily="49" charset="0"/>
-                <a:cs typeface="Courier New" panose="02070309020205020404" pitchFamily="49" charset="0"/>
-              </a:rPr>
-              <a:t>handleTeamsMessagingExtensionQuery</a:t>
-            </a:r>
-            <a:r>
-              <a:rPr lang="en-US" dirty="0">
-                <a:latin typeface="Courier New" panose="02070309020205020404" pitchFamily="49" charset="0"/>
-                <a:cs typeface="Courier New" panose="02070309020205020404" pitchFamily="49" charset="0"/>
-              </a:rPr>
-              <a:t>(context, query)</a:t>
-            </a:r>
-            <a:br>
-              <a:rPr lang="en-US" dirty="0">
-                <a:latin typeface="Courier New" panose="02070309020205020404" pitchFamily="49" charset="0"/>
-                <a:cs typeface="Courier New" panose="02070309020205020404" pitchFamily="49" charset="0"/>
-              </a:rPr>
-            </a:br>
-            <a:r>
-              <a:rPr lang="en-US" dirty="0">
-                <a:latin typeface="Courier New" panose="02070309020205020404" pitchFamily="49" charset="0"/>
-                <a:cs typeface="Courier New" panose="02070309020205020404" pitchFamily="49" charset="0"/>
-              </a:rPr>
-              <a:t>    : Promise&lt;</a:t>
-            </a:r>
-            <a:r>
-              <a:rPr lang="en-US" dirty="0" err="1">
+              <a:rPr lang="en-US" sz="1568" dirty="0" err="1">
+                <a:latin typeface="Courier New" panose="02070309020205020404" pitchFamily="49" charset="0"/>
+                <a:cs typeface="Courier New" panose="02070309020205020404" pitchFamily="49" charset="0"/>
+              </a:rPr>
+              <a:t>handleTeamsAppBasedLinkQuery</a:t>
+            </a:r>
+            <a:r>
+              <a:rPr lang="en-US" sz="1568" dirty="0">
+                <a:latin typeface="Courier New" panose="02070309020205020404" pitchFamily="49" charset="0"/>
+                <a:cs typeface="Courier New" panose="02070309020205020404" pitchFamily="49" charset="0"/>
+              </a:rPr>
+              <a:t>(</a:t>
+            </a:r>
+          </a:p>
+          <a:p>
+            <a:r>
+              <a:rPr lang="en-US" sz="1568" dirty="0">
+                <a:latin typeface="Courier New" panose="02070309020205020404" pitchFamily="49" charset="0"/>
+                <a:cs typeface="Courier New" panose="02070309020205020404" pitchFamily="49" charset="0"/>
+              </a:rPr>
+              <a:t>                             context: </a:t>
+            </a:r>
+            <a:r>
+              <a:rPr lang="en-US" sz="1568" dirty="0" err="1">
+                <a:latin typeface="Courier New" panose="02070309020205020404" pitchFamily="49" charset="0"/>
+                <a:cs typeface="Courier New" panose="02070309020205020404" pitchFamily="49" charset="0"/>
+              </a:rPr>
+              <a:t>TurnContext</a:t>
+            </a:r>
+            <a:r>
+              <a:rPr lang="en-US" sz="1568" dirty="0">
+                <a:latin typeface="Courier New" panose="02070309020205020404" pitchFamily="49" charset="0"/>
+                <a:cs typeface="Courier New" panose="02070309020205020404" pitchFamily="49" charset="0"/>
+              </a:rPr>
+              <a:t>, </a:t>
+            </a:r>
+          </a:p>
+          <a:p>
+            <a:r>
+              <a:rPr lang="en-US" sz="1568" dirty="0">
+                <a:latin typeface="Courier New" panose="02070309020205020404" pitchFamily="49" charset="0"/>
+                <a:cs typeface="Courier New" panose="02070309020205020404" pitchFamily="49" charset="0"/>
+              </a:rPr>
+              <a:t>                             query: </a:t>
+            </a:r>
+            <a:r>
+              <a:rPr lang="en-US" sz="1568" dirty="0" err="1">
+                <a:latin typeface="Courier New" panose="02070309020205020404" pitchFamily="49" charset="0"/>
+                <a:cs typeface="Courier New" panose="02070309020205020404" pitchFamily="49" charset="0"/>
+              </a:rPr>
+              <a:t>AppBasedLinkQuery</a:t>
+            </a:r>
+            <a:r>
+              <a:rPr lang="en-US" sz="1568" dirty="0">
+                <a:latin typeface="Courier New" panose="02070309020205020404" pitchFamily="49" charset="0"/>
+                <a:cs typeface="Courier New" panose="02070309020205020404" pitchFamily="49" charset="0"/>
+              </a:rPr>
+              <a:t>): Promise&lt;</a:t>
+            </a:r>
+            <a:r>
+              <a:rPr lang="en-US" sz="1568" dirty="0" err="1">
                 <a:latin typeface="Courier New" panose="02070309020205020404" pitchFamily="49" charset="0"/>
                 <a:cs typeface="Courier New" panose="02070309020205020404" pitchFamily="49" charset="0"/>
               </a:rPr>
               <a:t>MessagingExtensionResponse</a:t>
             </a:r>
             <a:r>
-              <a:rPr lang="en-US" dirty="0">
+              <a:rPr lang="en-US" sz="1568" dirty="0">
                 <a:latin typeface="Courier New" panose="02070309020205020404" pitchFamily="49" charset="0"/>
                 <a:cs typeface="Courier New" panose="02070309020205020404" pitchFamily="49" charset="0"/>
               </a:rPr>
@@ -10145,233 +11094,254 @@
             </a:r>
           </a:p>
           <a:p>
-            <a:pPr marL="0" indent="0">
-              <a:buNone/>
-            </a:pPr>
-            <a:r>
-              <a:rPr lang="en-US" dirty="0">
-                <a:latin typeface="Courier New" panose="02070309020205020404" pitchFamily="49" charset="0"/>
-                <a:cs typeface="Courier New" panose="02070309020205020404" pitchFamily="49" charset="0"/>
-              </a:rPr>
-              <a:t>    // get the search query</a:t>
-            </a:r>
-          </a:p>
-          <a:p>
-            <a:pPr marL="0" indent="0">
-              <a:buNone/>
-            </a:pPr>
-            <a:r>
-              <a:rPr lang="en-US" dirty="0">
-                <a:latin typeface="Courier New" panose="02070309020205020404" pitchFamily="49" charset="0"/>
-                <a:cs typeface="Courier New" panose="02070309020205020404" pitchFamily="49" charset="0"/>
-              </a:rPr>
-              <a:t>    let </a:t>
-            </a:r>
-            <a:r>
-              <a:rPr lang="en-US" dirty="0" err="1">
-                <a:latin typeface="Courier New" panose="02070309020205020404" pitchFamily="49" charset="0"/>
-                <a:cs typeface="Courier New" panose="02070309020205020404" pitchFamily="49" charset="0"/>
-              </a:rPr>
-              <a:t>searchQuery</a:t>
-            </a:r>
-            <a:r>
-              <a:rPr lang="en-US" dirty="0">
+            <a:r>
+              <a:rPr lang="en-US" sz="1568" dirty="0">
+                <a:latin typeface="Courier New" panose="02070309020205020404" pitchFamily="49" charset="0"/>
+                <a:cs typeface="Courier New" panose="02070309020205020404" pitchFamily="49" charset="0"/>
+              </a:rPr>
+              <a:t>    // get the selected planet</a:t>
+            </a:r>
+          </a:p>
+          <a:p>
+            <a:r>
+              <a:rPr lang="en-US" sz="1568" dirty="0">
+                <a:latin typeface="Courier New" panose="02070309020205020404" pitchFamily="49" charset="0"/>
+                <a:cs typeface="Courier New" panose="02070309020205020404" pitchFamily="49" charset="0"/>
+              </a:rPr>
+              <a:t>    const </a:t>
+            </a:r>
+            <a:r>
+              <a:rPr lang="en-US" sz="1568" dirty="0" err="1">
+                <a:latin typeface="Courier New" panose="02070309020205020404" pitchFamily="49" charset="0"/>
+                <a:cs typeface="Courier New" panose="02070309020205020404" pitchFamily="49" charset="0"/>
+              </a:rPr>
+              <a:t>selectedPlanet</a:t>
+            </a:r>
+            <a:r>
+              <a:rPr lang="en-US" sz="1568" dirty="0">
+                <a:latin typeface="Courier New" panose="02070309020205020404" pitchFamily="49" charset="0"/>
+                <a:cs typeface="Courier New" panose="02070309020205020404" pitchFamily="49" charset="0"/>
+              </a:rPr>
+              <a:t>: any = </a:t>
+            </a:r>
+            <a:r>
+              <a:rPr lang="en-US" sz="1568" dirty="0" err="1">
+                <a:latin typeface="Courier New" panose="02070309020205020404" pitchFamily="49" charset="0"/>
+                <a:cs typeface="Courier New" panose="02070309020205020404" pitchFamily="49" charset="0"/>
+              </a:rPr>
+              <a:t>planets.filter</a:t>
+            </a:r>
+            <a:r>
+              <a:rPr lang="en-US" sz="1568" dirty="0">
+                <a:latin typeface="Courier New" panose="02070309020205020404" pitchFamily="49" charset="0"/>
+                <a:cs typeface="Courier New" panose="02070309020205020404" pitchFamily="49" charset="0"/>
+              </a:rPr>
+              <a:t>((planet) =&gt; </a:t>
+            </a:r>
+            <a:r>
+              <a:rPr lang="en-US" sz="1568" dirty="0" err="1">
+                <a:latin typeface="Courier New" panose="02070309020205020404" pitchFamily="49" charset="0"/>
+                <a:cs typeface="Courier New" panose="02070309020205020404" pitchFamily="49" charset="0"/>
+              </a:rPr>
+              <a:t>planet.wikiLink</a:t>
+            </a:r>
+            <a:r>
+              <a:rPr lang="en-US" sz="1568" dirty="0">
+                <a:latin typeface="Courier New" panose="02070309020205020404" pitchFamily="49" charset="0"/>
+                <a:cs typeface="Courier New" panose="02070309020205020404" pitchFamily="49" charset="0"/>
+              </a:rPr>
+              <a:t> === </a:t>
+            </a:r>
+            <a:r>
+              <a:rPr lang="en-US" sz="1568" dirty="0" err="1">
+                <a:latin typeface="Courier New" panose="02070309020205020404" pitchFamily="49" charset="0"/>
+                <a:cs typeface="Courier New" panose="02070309020205020404" pitchFamily="49" charset="0"/>
+              </a:rPr>
+              <a:t>query.url</a:t>
+            </a:r>
+            <a:r>
+              <a:rPr lang="en-US" sz="1568" dirty="0">
+                <a:latin typeface="Courier New" panose="02070309020205020404" pitchFamily="49" charset="0"/>
+                <a:cs typeface="Courier New" panose="02070309020205020404" pitchFamily="49" charset="0"/>
+              </a:rPr>
+              <a:t>)[0];</a:t>
+            </a:r>
+          </a:p>
+          <a:p>
+            <a:r>
+              <a:rPr lang="en-US" sz="1568" dirty="0">
+                <a:latin typeface="Courier New" panose="02070309020205020404" pitchFamily="49" charset="0"/>
+                <a:cs typeface="Courier New" panose="02070309020205020404" pitchFamily="49" charset="0"/>
+              </a:rPr>
+              <a:t>    const </a:t>
+            </a:r>
+            <a:r>
+              <a:rPr lang="en-US" sz="1568" dirty="0" err="1">
+                <a:latin typeface="Courier New" panose="02070309020205020404" pitchFamily="49" charset="0"/>
+                <a:cs typeface="Courier New" panose="02070309020205020404" pitchFamily="49" charset="0"/>
+              </a:rPr>
+              <a:t>adaptiveCard</a:t>
+            </a:r>
+            <a:r>
+              <a:rPr lang="en-US" sz="1568" dirty="0">
                 <a:latin typeface="Courier New" panose="02070309020205020404" pitchFamily="49" charset="0"/>
                 <a:cs typeface="Courier New" panose="02070309020205020404" pitchFamily="49" charset="0"/>
               </a:rPr>
               <a:t> = </a:t>
             </a:r>
             <a:r>
-              <a:rPr lang="en-US" dirty="0" err="1">
-                <a:latin typeface="Courier New" panose="02070309020205020404" pitchFamily="49" charset="0"/>
-                <a:cs typeface="Courier New" panose="02070309020205020404" pitchFamily="49" charset="0"/>
-              </a:rPr>
-              <a:t>query.parameters</a:t>
-            </a:r>
-            <a:r>
-              <a:rPr lang="en-US" dirty="0">
-                <a:latin typeface="Courier New" panose="02070309020205020404" pitchFamily="49" charset="0"/>
-                <a:cs typeface="Courier New" panose="02070309020205020404" pitchFamily="49" charset="0"/>
-              </a:rPr>
-              <a:t>[0].</a:t>
-            </a:r>
-            <a:r>
-              <a:rPr lang="en-US" dirty="0" err="1">
-                <a:latin typeface="Courier New" panose="02070309020205020404" pitchFamily="49" charset="0"/>
-                <a:cs typeface="Courier New" panose="02070309020205020404" pitchFamily="49" charset="0"/>
-              </a:rPr>
-              <a:t>value.trim</a:t>
-            </a:r>
-            <a:r>
-              <a:rPr lang="en-US" dirty="0">
-                <a:latin typeface="Courier New" panose="02070309020205020404" pitchFamily="49" charset="0"/>
-                <a:cs typeface="Courier New" panose="02070309020205020404" pitchFamily="49" charset="0"/>
-              </a:rPr>
-              <a:t>().</a:t>
-            </a:r>
-            <a:r>
-              <a:rPr lang="en-US" dirty="0" err="1">
-                <a:latin typeface="Courier New" panose="02070309020205020404" pitchFamily="49" charset="0"/>
-                <a:cs typeface="Courier New" panose="02070309020205020404" pitchFamily="49" charset="0"/>
-              </a:rPr>
-              <a:t>toLowerCase</a:t>
-            </a:r>
-            <a:r>
-              <a:rPr lang="en-US" dirty="0">
-                <a:latin typeface="Courier New" panose="02070309020205020404" pitchFamily="49" charset="0"/>
-                <a:cs typeface="Courier New" panose="02070309020205020404" pitchFamily="49" charset="0"/>
-              </a:rPr>
-              <a:t>();</a:t>
-            </a:r>
-          </a:p>
-          <a:p>
-            <a:pPr marL="0" indent="0">
-              <a:buNone/>
-            </a:pPr>
-            <a:r>
-              <a:rPr lang="en-US" dirty="0">
-                <a:latin typeface="Courier New" panose="02070309020205020404" pitchFamily="49" charset="0"/>
-                <a:cs typeface="Courier New" panose="02070309020205020404" pitchFamily="49" charset="0"/>
-              </a:rPr>
-              <a:t>    // execute search logic</a:t>
-            </a:r>
-          </a:p>
-          <a:p>
-            <a:pPr marL="0" indent="0">
-              <a:buNone/>
-            </a:pPr>
-            <a:r>
-              <a:rPr lang="en-US" dirty="0">
-                <a:latin typeface="Courier New" panose="02070309020205020404" pitchFamily="49" charset="0"/>
-                <a:cs typeface="Courier New" panose="02070309020205020404" pitchFamily="49" charset="0"/>
-              </a:rPr>
-              <a:t>    let </a:t>
-            </a:r>
-            <a:r>
-              <a:rPr lang="en-US" dirty="0" err="1">
-                <a:latin typeface="Courier New" panose="02070309020205020404" pitchFamily="49" charset="0"/>
-                <a:cs typeface="Courier New" panose="02070309020205020404" pitchFamily="49" charset="0"/>
-              </a:rPr>
-              <a:t>queryResults</a:t>
-            </a:r>
-            <a:r>
-              <a:rPr lang="en-US" dirty="0">
-                <a:latin typeface="Courier New" panose="02070309020205020404" pitchFamily="49" charset="0"/>
-                <a:cs typeface="Courier New" panose="02070309020205020404" pitchFamily="49" charset="0"/>
-              </a:rPr>
-              <a:t>: string[] = ...;</a:t>
-            </a:r>
-          </a:p>
-          <a:p>
-            <a:pPr marL="0" indent="0">
-              <a:buNone/>
-            </a:pPr>
-            <a:r>
-              <a:rPr lang="en-US" dirty="0">
-                <a:latin typeface="Courier New" panose="02070309020205020404" pitchFamily="49" charset="0"/>
-                <a:cs typeface="Courier New" panose="02070309020205020404" pitchFamily="49" charset="0"/>
-              </a:rPr>
-              <a:t>    // get results as cards</a:t>
-            </a:r>
-          </a:p>
-          <a:p>
-            <a:pPr marL="0" indent="0">
-              <a:buNone/>
-            </a:pPr>
-            <a:r>
-              <a:rPr lang="en-US" dirty="0">
-                <a:latin typeface="Courier New" panose="02070309020205020404" pitchFamily="49" charset="0"/>
-                <a:cs typeface="Courier New" panose="02070309020205020404" pitchFamily="49" charset="0"/>
-              </a:rPr>
-              <a:t>    let cards: </a:t>
-            </a:r>
-            <a:r>
-              <a:rPr lang="en-US" dirty="0" err="1">
-                <a:latin typeface="Courier New" panose="02070309020205020404" pitchFamily="49" charset="0"/>
-                <a:cs typeface="Courier New" panose="02070309020205020404" pitchFamily="49" charset="0"/>
-              </a:rPr>
-              <a:t>MessagingExtensionAttachment</a:t>
-            </a:r>
-            <a:r>
-              <a:rPr lang="en-US" dirty="0">
-                <a:latin typeface="Courier New" panose="02070309020205020404" pitchFamily="49" charset="0"/>
-                <a:cs typeface="Courier New" panose="02070309020205020404" pitchFamily="49" charset="0"/>
-              </a:rPr>
-              <a:t>[] = [];</a:t>
-            </a:r>
-          </a:p>
-          <a:p>
-            <a:pPr marL="0" indent="0">
-              <a:buNone/>
-            </a:pPr>
-            <a:r>
-              <a:rPr lang="en-US" dirty="0">
-                <a:latin typeface="Courier New" panose="02070309020205020404" pitchFamily="49" charset="0"/>
-                <a:cs typeface="Courier New" panose="02070309020205020404" pitchFamily="49" charset="0"/>
-              </a:rPr>
-              <a:t>    </a:t>
-            </a:r>
-            <a:r>
-              <a:rPr lang="en-US" dirty="0" err="1">
-                <a:latin typeface="Courier New" panose="02070309020205020404" pitchFamily="49" charset="0"/>
-                <a:cs typeface="Courier New" panose="02070309020205020404" pitchFamily="49" charset="0"/>
-              </a:rPr>
-              <a:t>queryResults.forEach</a:t>
-            </a:r>
-            <a:r>
-              <a:rPr lang="en-US" dirty="0">
-                <a:latin typeface="Courier New" panose="02070309020205020404" pitchFamily="49" charset="0"/>
-                <a:cs typeface="Courier New" panose="02070309020205020404" pitchFamily="49" charset="0"/>
-              </a:rPr>
-              <a:t>((planet) =&gt; {</a:t>
-            </a:r>
-          </a:p>
-          <a:p>
-            <a:pPr marL="0" indent="0">
-              <a:buNone/>
-            </a:pPr>
-            <a:r>
-              <a:rPr lang="en-US" dirty="0">
+              <a:rPr lang="en-US" sz="1568" dirty="0" err="1">
+                <a:latin typeface="Courier New" panose="02070309020205020404" pitchFamily="49" charset="0"/>
+                <a:cs typeface="Courier New" panose="02070309020205020404" pitchFamily="49" charset="0"/>
+              </a:rPr>
+              <a:t>this.getPlanetDetailCard</a:t>
+            </a:r>
+            <a:r>
+              <a:rPr lang="en-US" sz="1568" dirty="0">
+                <a:latin typeface="Courier New" panose="02070309020205020404" pitchFamily="49" charset="0"/>
+                <a:cs typeface="Courier New" panose="02070309020205020404" pitchFamily="49" charset="0"/>
+              </a:rPr>
+              <a:t>(</a:t>
+            </a:r>
+            <a:r>
+              <a:rPr lang="en-US" sz="1568" dirty="0" err="1">
+                <a:latin typeface="Courier New" panose="02070309020205020404" pitchFamily="49" charset="0"/>
+                <a:cs typeface="Courier New" panose="02070309020205020404" pitchFamily="49" charset="0"/>
+              </a:rPr>
+              <a:t>selectedPlanet</a:t>
+            </a:r>
+            <a:r>
+              <a:rPr lang="en-US" sz="1568" dirty="0">
+                <a:latin typeface="Courier New" panose="02070309020205020404" pitchFamily="49" charset="0"/>
+                <a:cs typeface="Courier New" panose="02070309020205020404" pitchFamily="49" charset="0"/>
+              </a:rPr>
+              <a:t>);</a:t>
+            </a:r>
+          </a:p>
+          <a:p>
+            <a:endParaRPr lang="en-US" sz="1568" dirty="0">
+              <a:latin typeface="Courier New" panose="02070309020205020404" pitchFamily="49" charset="0"/>
+              <a:cs typeface="Courier New" panose="02070309020205020404" pitchFamily="49" charset="0"/>
+            </a:endParaRPr>
+          </a:p>
+          <a:p>
+            <a:r>
+              <a:rPr lang="en-US" sz="1568" dirty="0">
+                <a:latin typeface="Courier New" panose="02070309020205020404" pitchFamily="49" charset="0"/>
+                <a:cs typeface="Courier New" panose="02070309020205020404" pitchFamily="49" charset="0"/>
+              </a:rPr>
+              <a:t>    // generate the response</a:t>
+            </a:r>
+          </a:p>
+          <a:p>
+            <a:r>
+              <a:rPr lang="en-US" sz="1568" dirty="0">
+                <a:latin typeface="Courier New" panose="02070309020205020404" pitchFamily="49" charset="0"/>
+                <a:cs typeface="Courier New" panose="02070309020205020404" pitchFamily="49" charset="0"/>
+              </a:rPr>
+              <a:t>    return </a:t>
+            </a:r>
+            <a:r>
+              <a:rPr lang="en-US" sz="1568" dirty="0" err="1">
+                <a:latin typeface="Courier New" panose="02070309020205020404" pitchFamily="49" charset="0"/>
+                <a:cs typeface="Courier New" panose="02070309020205020404" pitchFamily="49" charset="0"/>
+              </a:rPr>
+              <a:t>Promise.resolve</a:t>
+            </a:r>
+            <a:r>
+              <a:rPr lang="en-US" sz="1568" dirty="0">
+                <a:latin typeface="Courier New" panose="02070309020205020404" pitchFamily="49" charset="0"/>
+                <a:cs typeface="Courier New" panose="02070309020205020404" pitchFamily="49" charset="0"/>
+              </a:rPr>
+              <a:t>(&lt;</a:t>
+            </a:r>
+            <a:r>
+              <a:rPr lang="en-US" sz="1568" dirty="0" err="1">
+                <a:latin typeface="Courier New" panose="02070309020205020404" pitchFamily="49" charset="0"/>
+                <a:cs typeface="Courier New" panose="02070309020205020404" pitchFamily="49" charset="0"/>
+              </a:rPr>
+              <a:t>MessagingExtensionActionResponse</a:t>
+            </a:r>
+            <a:r>
+              <a:rPr lang="en-US" sz="1568" dirty="0">
+                <a:latin typeface="Courier New" panose="02070309020205020404" pitchFamily="49" charset="0"/>
+                <a:cs typeface="Courier New" panose="02070309020205020404" pitchFamily="49" charset="0"/>
+              </a:rPr>
+              <a:t>&gt;{</a:t>
+            </a:r>
+          </a:p>
+          <a:p>
+            <a:r>
+              <a:rPr lang="en-US" sz="1568" dirty="0">
                 <a:latin typeface="Courier New" panose="02070309020205020404" pitchFamily="49" charset="0"/>
                 <a:cs typeface="Courier New" panose="02070309020205020404" pitchFamily="49" charset="0"/>
               </a:rPr>
               <a:t>      </a:t>
             </a:r>
             <a:r>
-              <a:rPr lang="en-US" dirty="0" err="1">
-                <a:latin typeface="Courier New" panose="02070309020205020404" pitchFamily="49" charset="0"/>
-                <a:cs typeface="Courier New" panose="02070309020205020404" pitchFamily="49" charset="0"/>
-              </a:rPr>
-              <a:t>cards.push</a:t>
-            </a:r>
-            <a:r>
-              <a:rPr lang="en-US" dirty="0">
-                <a:latin typeface="Courier New" panose="02070309020205020404" pitchFamily="49" charset="0"/>
-                <a:cs typeface="Courier New" panose="02070309020205020404" pitchFamily="49" charset="0"/>
-              </a:rPr>
-              <a:t>(</a:t>
-            </a:r>
-            <a:r>
-              <a:rPr lang="en-US" dirty="0" err="1">
-                <a:latin typeface="Courier New" panose="02070309020205020404" pitchFamily="49" charset="0"/>
-                <a:cs typeface="Courier New" panose="02070309020205020404" pitchFamily="49" charset="0"/>
-              </a:rPr>
-              <a:t>this.getPlanetResultCard</a:t>
-            </a:r>
-            <a:r>
-              <a:rPr lang="en-US" dirty="0">
-                <a:latin typeface="Courier New" panose="02070309020205020404" pitchFamily="49" charset="0"/>
-                <a:cs typeface="Courier New" panose="02070309020205020404" pitchFamily="49" charset="0"/>
-              </a:rPr>
-              <a:t>(planet));</a:t>
-            </a:r>
-          </a:p>
-          <a:p>
-            <a:pPr marL="0" indent="0">
-              <a:buNone/>
-            </a:pPr>
-            <a:r>
-              <a:rPr lang="en-US" dirty="0">
+              <a:rPr lang="en-US" sz="1568" dirty="0" err="1">
+                <a:latin typeface="Courier New" panose="02070309020205020404" pitchFamily="49" charset="0"/>
+                <a:cs typeface="Courier New" panose="02070309020205020404" pitchFamily="49" charset="0"/>
+              </a:rPr>
+              <a:t>composeExtension</a:t>
+            </a:r>
+            <a:r>
+              <a:rPr lang="en-US" sz="1568" dirty="0">
+                <a:latin typeface="Courier New" panose="02070309020205020404" pitchFamily="49" charset="0"/>
+                <a:cs typeface="Courier New" panose="02070309020205020404" pitchFamily="49" charset="0"/>
+              </a:rPr>
+              <a:t>: {</a:t>
+            </a:r>
+          </a:p>
+          <a:p>
+            <a:r>
+              <a:rPr lang="en-US" sz="1568" dirty="0">
+                <a:latin typeface="Courier New" panose="02070309020205020404" pitchFamily="49" charset="0"/>
+                <a:cs typeface="Courier New" panose="02070309020205020404" pitchFamily="49" charset="0"/>
+              </a:rPr>
+              <a:t>        type: "result", </a:t>
+            </a:r>
+            <a:r>
+              <a:rPr lang="en-US" sz="1568" dirty="0" err="1">
+                <a:latin typeface="Courier New" panose="02070309020205020404" pitchFamily="49" charset="0"/>
+                <a:cs typeface="Courier New" panose="02070309020205020404" pitchFamily="49" charset="0"/>
+              </a:rPr>
+              <a:t>attachmentLayout</a:t>
+            </a:r>
+            <a:r>
+              <a:rPr lang="en-US" sz="1568" dirty="0">
+                <a:latin typeface="Courier New" panose="02070309020205020404" pitchFamily="49" charset="0"/>
+                <a:cs typeface="Courier New" panose="02070309020205020404" pitchFamily="49" charset="0"/>
+              </a:rPr>
+              <a:t>: "list", attachments: [</a:t>
+            </a:r>
+            <a:r>
+              <a:rPr lang="en-US" sz="1568" dirty="0" err="1">
+                <a:latin typeface="Courier New" panose="02070309020205020404" pitchFamily="49" charset="0"/>
+                <a:cs typeface="Courier New" panose="02070309020205020404" pitchFamily="49" charset="0"/>
+              </a:rPr>
+              <a:t>adaptiveCard</a:t>
+            </a:r>
+            <a:r>
+              <a:rPr lang="en-US" sz="1568" dirty="0">
+                <a:latin typeface="Courier New" panose="02070309020205020404" pitchFamily="49" charset="0"/>
+                <a:cs typeface="Courier New" panose="02070309020205020404" pitchFamily="49" charset="0"/>
+              </a:rPr>
+              <a:t>]</a:t>
+            </a:r>
+          </a:p>
+          <a:p>
+            <a:r>
+              <a:rPr lang="en-US" sz="1568" dirty="0">
+                <a:latin typeface="Courier New" panose="02070309020205020404" pitchFamily="49" charset="0"/>
+                <a:cs typeface="Courier New" panose="02070309020205020404" pitchFamily="49" charset="0"/>
+              </a:rPr>
+              <a:t>      }</a:t>
+            </a:r>
+          </a:p>
+          <a:p>
+            <a:r>
+              <a:rPr lang="en-US" sz="1568" dirty="0">
                 <a:latin typeface="Courier New" panose="02070309020205020404" pitchFamily="49" charset="0"/>
                 <a:cs typeface="Courier New" panose="02070309020205020404" pitchFamily="49" charset="0"/>
               </a:rPr>
@@ -10379,132 +11349,20 @@
             </a:r>
           </a:p>
           <a:p>
-            <a:pPr marL="0" indent="0">
-              <a:buNone/>
-            </a:pPr>
-            <a:r>
-              <a:rPr lang="en-US" dirty="0">
-                <a:latin typeface="Courier New" panose="02070309020205020404" pitchFamily="49" charset="0"/>
-                <a:cs typeface="Courier New" panose="02070309020205020404" pitchFamily="49" charset="0"/>
-              </a:rPr>
-              <a:t>    let response: </a:t>
-            </a:r>
-            <a:r>
-              <a:rPr lang="en-US" dirty="0" err="1">
-                <a:latin typeface="Courier New" panose="02070309020205020404" pitchFamily="49" charset="0"/>
-                <a:cs typeface="Courier New" panose="02070309020205020404" pitchFamily="49" charset="0"/>
-              </a:rPr>
-              <a:t>MessagingExtensionResponse</a:t>
-            </a:r>
-            <a:r>
-              <a:rPr lang="en-US" dirty="0">
-                <a:latin typeface="Courier New" panose="02070309020205020404" pitchFamily="49" charset="0"/>
-                <a:cs typeface="Courier New" panose="02070309020205020404" pitchFamily="49" charset="0"/>
-              </a:rPr>
-              <a:t> = &lt;</a:t>
-            </a:r>
-            <a:r>
-              <a:rPr lang="en-US" dirty="0" err="1">
-                <a:latin typeface="Courier New" panose="02070309020205020404" pitchFamily="49" charset="0"/>
-                <a:cs typeface="Courier New" panose="02070309020205020404" pitchFamily="49" charset="0"/>
-              </a:rPr>
-              <a:t>MessagingExtensionResponse</a:t>
-            </a:r>
-            <a:r>
-              <a:rPr lang="en-US" dirty="0">
-                <a:latin typeface="Courier New" panose="02070309020205020404" pitchFamily="49" charset="0"/>
-                <a:cs typeface="Courier New" panose="02070309020205020404" pitchFamily="49" charset="0"/>
-              </a:rPr>
-              <a:t>&gt;{</a:t>
-            </a:r>
-          </a:p>
-          <a:p>
-            <a:pPr marL="0" indent="0">
-              <a:buNone/>
-            </a:pPr>
-            <a:r>
-              <a:rPr lang="en-US" dirty="0">
-                <a:latin typeface="Courier New" panose="02070309020205020404" pitchFamily="49" charset="0"/>
-                <a:cs typeface="Courier New" panose="02070309020205020404" pitchFamily="49" charset="0"/>
-              </a:rPr>
-              <a:t>      </a:t>
-            </a:r>
-            <a:r>
-              <a:rPr lang="en-US" dirty="0" err="1">
-                <a:latin typeface="Courier New" panose="02070309020205020404" pitchFamily="49" charset="0"/>
-                <a:cs typeface="Courier New" panose="02070309020205020404" pitchFamily="49" charset="0"/>
-              </a:rPr>
-              <a:t>composeExtension</a:t>
-            </a:r>
-            <a:r>
-              <a:rPr lang="en-US" dirty="0">
-                <a:latin typeface="Courier New" panose="02070309020205020404" pitchFamily="49" charset="0"/>
-                <a:cs typeface="Courier New" panose="02070309020205020404" pitchFamily="49" charset="0"/>
-              </a:rPr>
-              <a:t>: { type: "result", </a:t>
-            </a:r>
-            <a:r>
-              <a:rPr lang="en-US" dirty="0" err="1">
-                <a:latin typeface="Courier New" panose="02070309020205020404" pitchFamily="49" charset="0"/>
-                <a:cs typeface="Courier New" panose="02070309020205020404" pitchFamily="49" charset="0"/>
-              </a:rPr>
-              <a:t>attachmentLayout</a:t>
-            </a:r>
-            <a:r>
-              <a:rPr lang="en-US" dirty="0">
-                <a:latin typeface="Courier New" panose="02070309020205020404" pitchFamily="49" charset="0"/>
-                <a:cs typeface="Courier New" panose="02070309020205020404" pitchFamily="49" charset="0"/>
-              </a:rPr>
-              <a:t>: "list", attachments: cards } };</a:t>
-            </a:r>
-          </a:p>
-          <a:p>
-            <a:pPr marL="0" indent="0">
-              <a:buNone/>
-            </a:pPr>
-            <a:r>
-              <a:rPr lang="en-US" dirty="0">
-                <a:latin typeface="Courier New" panose="02070309020205020404" pitchFamily="49" charset="0"/>
-                <a:cs typeface="Courier New" panose="02070309020205020404" pitchFamily="49" charset="0"/>
-              </a:rPr>
-              <a:t>    return </a:t>
-            </a:r>
-            <a:r>
-              <a:rPr lang="en-US" dirty="0" err="1">
-                <a:latin typeface="Courier New" panose="02070309020205020404" pitchFamily="49" charset="0"/>
-                <a:cs typeface="Courier New" panose="02070309020205020404" pitchFamily="49" charset="0"/>
-              </a:rPr>
-              <a:t>Promise.resolve</a:t>
-            </a:r>
-            <a:r>
-              <a:rPr lang="en-US" dirty="0">
-                <a:latin typeface="Courier New" panose="02070309020205020404" pitchFamily="49" charset="0"/>
-                <a:cs typeface="Courier New" panose="02070309020205020404" pitchFamily="49" charset="0"/>
-              </a:rPr>
-              <a:t>(response);</a:t>
-            </a:r>
-          </a:p>
-          <a:p>
-            <a:pPr marL="0" indent="0">
-              <a:buNone/>
-            </a:pPr>
-            <a:r>
-              <a:rPr lang="en-US" dirty="0">
+            <a:r>
+              <a:rPr lang="en-US" sz="1568" dirty="0">
                 <a:latin typeface="Courier New" panose="02070309020205020404" pitchFamily="49" charset="0"/>
                 <a:cs typeface="Courier New" panose="02070309020205020404" pitchFamily="49" charset="0"/>
               </a:rPr>
               <a:t>  } }</a:t>
             </a:r>
-          </a:p>
-          <a:p>
-            <a:endParaRPr lang="en-US" dirty="0"/>
           </a:p>
         </p:txBody>
       </p:sp>
     </p:spTree>
     <p:extLst>
       <p:ext uri="{BB962C8B-B14F-4D97-AF65-F5344CB8AC3E}">
-        <p14:creationId xmlns:p14="http://schemas.microsoft.com/office/powerpoint/2010/main" val="3588267498"/>
+        <p14:creationId xmlns:p14="http://schemas.microsoft.com/office/powerpoint/2010/main" val="1628516310"/>
       </p:ext>
     </p:extLst>
   </p:cSld>
@@ -10582,7 +11440,7 @@
           <a:p>
             <a:r>
               <a:rPr lang="en-US" dirty="0"/>
-              <a:t>Create search command messaging extensions</a:t>
+              <a:t>Link unfurling</a:t>
             </a:r>
           </a:p>
         </p:txBody>
@@ -12682,20 +13540,20 @@
 </file>
 
 <file path=customXml/item2.xml><?xml version="1.0" encoding="utf-8"?>
+<p:properties xmlns:p="http://schemas.microsoft.com/office/2006/metadata/properties" xmlns:xsi="http://www.w3.org/2001/XMLSchema-instance" xmlns:pc="http://schemas.microsoft.com/office/infopath/2007/PartnerControls">
+  <documentManagement>
+    <MediaServiceKeyPoints xmlns="61b79488-63fd-46f4-b1bf-09cb63d2085e" xsi:nil="true"/>
+  </documentManagement>
+</p:properties>
+</file>
+
+<file path=customXml/item3.xml><?xml version="1.0" encoding="utf-8"?>
 <?mso-contentType ?>
 <FormTemplates xmlns="http://schemas.microsoft.com/sharepoint/v3/contenttype/forms">
   <Display>DocumentLibraryForm</Display>
   <Edit>DocumentLibraryForm</Edit>
   <New>DocumentLibraryForm</New>
 </FormTemplates>
-</file>
-
-<file path=customXml/item3.xml><?xml version="1.0" encoding="utf-8"?>
-<p:properties xmlns:p="http://schemas.microsoft.com/office/2006/metadata/properties" xmlns:xsi="http://www.w3.org/2001/XMLSchema-instance" xmlns:pc="http://schemas.microsoft.com/office/infopath/2007/PartnerControls">
-  <documentManagement>
-    <MediaServiceKeyPoints xmlns="61b79488-63fd-46f4-b1bf-09cb63d2085e" xsi:nil="true"/>
-  </documentManagement>
-</p:properties>
 </file>
 
 <file path=customXml/itemProps1.xml><?xml version="1.0" encoding="utf-8"?>
@@ -12717,14 +13575,6 @@
 </file>
 
 <file path=customXml/itemProps2.xml><?xml version="1.0" encoding="utf-8"?>
-<ds:datastoreItem xmlns:ds="http://schemas.openxmlformats.org/officeDocument/2006/customXml" ds:itemID="{4875BE8C-CB08-400E-A21F-2497FF16C77B}">
-  <ds:schemaRefs>
-    <ds:schemaRef ds:uri="http://schemas.microsoft.com/sharepoint/v3/contenttype/forms"/>
-  </ds:schemaRefs>
-</ds:datastoreItem>
-</file>
-
-<file path=customXml/itemProps3.xml><?xml version="1.0" encoding="utf-8"?>
 <ds:datastoreItem xmlns:ds="http://schemas.openxmlformats.org/officeDocument/2006/customXml" ds:itemID="{56E9BD92-A245-451A-82D6-41724A6593BA}">
   <ds:schemaRefs>
     <ds:schemaRef ds:uri="http://purl.org/dc/elements/1.1/"/>
@@ -12740,6 +13590,14 @@
 </ds:datastoreItem>
 </file>
 
+<file path=customXml/itemProps3.xml><?xml version="1.0" encoding="utf-8"?>
+<ds:datastoreItem xmlns:ds="http://schemas.openxmlformats.org/officeDocument/2006/customXml" ds:itemID="{4875BE8C-CB08-400E-A21F-2497FF16C77B}">
+  <ds:schemaRefs>
+    <ds:schemaRef ds:uri="http://schemas.microsoft.com/sharepoint/v3/contenttype/forms"/>
+  </ds:schemaRefs>
+</ds:datastoreItem>
+</file>
+
 <file path=docMetadata/LabelInfo.xml><?xml version="1.0" encoding="utf-8"?>
 <clbl:labelList xmlns:clbl="http://schemas.microsoft.com/office/2020/mipLabelMetadata">
   <clbl:label id="{f42aa342-8706-4288-bd11-ebb85995028c}" enabled="1" method="Standard" siteId="{72f988bf-86f1-41af-91ab-2d7cd011db47}" removed="0"/>

</xml_diff>